<commit_message>
Common DC bus modelleri
</commit_message>
<xml_diff>
--- a/WPT/Series-Parallel/Report/Generalized_series_parallel_DC.pptx
+++ b/WPT/Series-Parallel/Report/Generalized_series_parallel_DC.pptx
@@ -8,35 +8,36 @@
     <p:sldId id="256" r:id="rId2"/>
     <p:sldId id="257" r:id="rId3"/>
     <p:sldId id="258" r:id="rId4"/>
-    <p:sldId id="262" r:id="rId5"/>
-    <p:sldId id="259" r:id="rId6"/>
-    <p:sldId id="260" r:id="rId7"/>
-    <p:sldId id="263" r:id="rId8"/>
-    <p:sldId id="261" r:id="rId9"/>
-    <p:sldId id="264" r:id="rId10"/>
-    <p:sldId id="265" r:id="rId11"/>
-    <p:sldId id="266" r:id="rId12"/>
-    <p:sldId id="267" r:id="rId13"/>
-    <p:sldId id="270" r:id="rId14"/>
-    <p:sldId id="276" r:id="rId15"/>
-    <p:sldId id="277" r:id="rId16"/>
-    <p:sldId id="278" r:id="rId17"/>
-    <p:sldId id="279" r:id="rId18"/>
-    <p:sldId id="280" r:id="rId19"/>
-    <p:sldId id="271" r:id="rId20"/>
-    <p:sldId id="272" r:id="rId21"/>
-    <p:sldId id="284" r:id="rId22"/>
-    <p:sldId id="285" r:id="rId23"/>
-    <p:sldId id="286" r:id="rId24"/>
-    <p:sldId id="287" r:id="rId25"/>
-    <p:sldId id="274" r:id="rId26"/>
-    <p:sldId id="288" r:id="rId27"/>
-    <p:sldId id="292" r:id="rId28"/>
-    <p:sldId id="275" r:id="rId29"/>
-    <p:sldId id="273" r:id="rId30"/>
-    <p:sldId id="281" r:id="rId31"/>
-    <p:sldId id="282" r:id="rId32"/>
-    <p:sldId id="283" r:id="rId33"/>
+    <p:sldId id="293" r:id="rId5"/>
+    <p:sldId id="262" r:id="rId6"/>
+    <p:sldId id="259" r:id="rId7"/>
+    <p:sldId id="260" r:id="rId8"/>
+    <p:sldId id="263" r:id="rId9"/>
+    <p:sldId id="261" r:id="rId10"/>
+    <p:sldId id="264" r:id="rId11"/>
+    <p:sldId id="265" r:id="rId12"/>
+    <p:sldId id="266" r:id="rId13"/>
+    <p:sldId id="267" r:id="rId14"/>
+    <p:sldId id="270" r:id="rId15"/>
+    <p:sldId id="276" r:id="rId16"/>
+    <p:sldId id="277" r:id="rId17"/>
+    <p:sldId id="278" r:id="rId18"/>
+    <p:sldId id="279" r:id="rId19"/>
+    <p:sldId id="280" r:id="rId20"/>
+    <p:sldId id="271" r:id="rId21"/>
+    <p:sldId id="272" r:id="rId22"/>
+    <p:sldId id="284" r:id="rId23"/>
+    <p:sldId id="285" r:id="rId24"/>
+    <p:sldId id="286" r:id="rId25"/>
+    <p:sldId id="287" r:id="rId26"/>
+    <p:sldId id="274" r:id="rId27"/>
+    <p:sldId id="288" r:id="rId28"/>
+    <p:sldId id="292" r:id="rId29"/>
+    <p:sldId id="275" r:id="rId30"/>
+    <p:sldId id="273" r:id="rId31"/>
+    <p:sldId id="281" r:id="rId32"/>
+    <p:sldId id="282" r:id="rId33"/>
+    <p:sldId id="283" r:id="rId34"/>
   </p:sldIdLst>
   <p:sldSz cx="12192000" cy="6858000"/>
   <p:notesSz cx="6858000" cy="9144000"/>
@@ -290,7 +291,7 @@
           <a:p>
             <a:fld id="{F986B7C5-AD77-4FAB-A680-74E4382CF8C4}" type="datetimeFigureOut">
               <a:rPr lang="en-US" smtClean="0"/>
-              <a:t>10/14/2020</a:t>
+              <a:t>10/31/2020</a:t>
             </a:fld>
             <a:endParaRPr lang="en-US"/>
           </a:p>
@@ -488,7 +489,7 @@
           <a:p>
             <a:fld id="{F986B7C5-AD77-4FAB-A680-74E4382CF8C4}" type="datetimeFigureOut">
               <a:rPr lang="en-US" smtClean="0"/>
-              <a:t>10/14/2020</a:t>
+              <a:t>10/31/2020</a:t>
             </a:fld>
             <a:endParaRPr lang="en-US"/>
           </a:p>
@@ -696,7 +697,7 @@
           <a:p>
             <a:fld id="{F986B7C5-AD77-4FAB-A680-74E4382CF8C4}" type="datetimeFigureOut">
               <a:rPr lang="en-US" smtClean="0"/>
-              <a:t>10/14/2020</a:t>
+              <a:t>10/31/2020</a:t>
             </a:fld>
             <a:endParaRPr lang="en-US"/>
           </a:p>
@@ -894,7 +895,7 @@
           <a:p>
             <a:fld id="{F986B7C5-AD77-4FAB-A680-74E4382CF8C4}" type="datetimeFigureOut">
               <a:rPr lang="en-US" smtClean="0"/>
-              <a:t>10/14/2020</a:t>
+              <a:t>10/31/2020</a:t>
             </a:fld>
             <a:endParaRPr lang="en-US"/>
           </a:p>
@@ -1169,7 +1170,7 @@
           <a:p>
             <a:fld id="{F986B7C5-AD77-4FAB-A680-74E4382CF8C4}" type="datetimeFigureOut">
               <a:rPr lang="en-US" smtClean="0"/>
-              <a:t>10/14/2020</a:t>
+              <a:t>10/31/2020</a:t>
             </a:fld>
             <a:endParaRPr lang="en-US"/>
           </a:p>
@@ -1434,7 +1435,7 @@
           <a:p>
             <a:fld id="{F986B7C5-AD77-4FAB-A680-74E4382CF8C4}" type="datetimeFigureOut">
               <a:rPr lang="en-US" smtClean="0"/>
-              <a:t>10/14/2020</a:t>
+              <a:t>10/31/2020</a:t>
             </a:fld>
             <a:endParaRPr lang="en-US"/>
           </a:p>
@@ -1846,7 +1847,7 @@
           <a:p>
             <a:fld id="{F986B7C5-AD77-4FAB-A680-74E4382CF8C4}" type="datetimeFigureOut">
               <a:rPr lang="en-US" smtClean="0"/>
-              <a:t>10/14/2020</a:t>
+              <a:t>10/31/2020</a:t>
             </a:fld>
             <a:endParaRPr lang="en-US"/>
           </a:p>
@@ -1987,7 +1988,7 @@
           <a:p>
             <a:fld id="{F986B7C5-AD77-4FAB-A680-74E4382CF8C4}" type="datetimeFigureOut">
               <a:rPr lang="en-US" smtClean="0"/>
-              <a:t>10/14/2020</a:t>
+              <a:t>10/31/2020</a:t>
             </a:fld>
             <a:endParaRPr lang="en-US"/>
           </a:p>
@@ -2100,7 +2101,7 @@
           <a:p>
             <a:fld id="{F986B7C5-AD77-4FAB-A680-74E4382CF8C4}" type="datetimeFigureOut">
               <a:rPr lang="en-US" smtClean="0"/>
-              <a:t>10/14/2020</a:t>
+              <a:t>10/31/2020</a:t>
             </a:fld>
             <a:endParaRPr lang="en-US"/>
           </a:p>
@@ -2411,7 +2412,7 @@
           <a:p>
             <a:fld id="{F986B7C5-AD77-4FAB-A680-74E4382CF8C4}" type="datetimeFigureOut">
               <a:rPr lang="en-US" smtClean="0"/>
-              <a:t>10/14/2020</a:t>
+              <a:t>10/31/2020</a:t>
             </a:fld>
             <a:endParaRPr lang="en-US"/>
           </a:p>
@@ -2699,7 +2700,7 @@
           <a:p>
             <a:fld id="{F986B7C5-AD77-4FAB-A680-74E4382CF8C4}" type="datetimeFigureOut">
               <a:rPr lang="en-US" smtClean="0"/>
-              <a:t>10/14/2020</a:t>
+              <a:t>10/31/2020</a:t>
             </a:fld>
             <a:endParaRPr lang="en-US"/>
           </a:p>
@@ -2940,7 +2941,7 @@
           <a:p>
             <a:fld id="{F986B7C5-AD77-4FAB-A680-74E4382CF8C4}" type="datetimeFigureOut">
               <a:rPr lang="en-US" smtClean="0"/>
-              <a:t>10/14/2020</a:t>
+              <a:t>10/31/2020</a:t>
             </a:fld>
             <a:endParaRPr lang="en-US"/>
           </a:p>
@@ -3444,6 +3445,498 @@
           <a:chExt cx="0" cy="0"/>
         </a:xfrm>
       </p:grpSpPr>
+      <p:sp>
+        <p:nvSpPr>
+          <p:cNvPr id="3" name="TextBox 2">
+            <a:extLst>
+              <a:ext uri="{FF2B5EF4-FFF2-40B4-BE49-F238E27FC236}">
+                <a16:creationId xmlns:a16="http://schemas.microsoft.com/office/drawing/2014/main" id="{64B0A007-14B1-4ED6-B4ED-575B93B3FE4C}"/>
+              </a:ext>
+            </a:extLst>
+          </p:cNvPr>
+          <p:cNvSpPr txBox="1"/>
+          <p:nvPr/>
+        </p:nvSpPr>
+        <p:spPr>
+          <a:xfrm>
+            <a:off x="3194612" y="289367"/>
+            <a:ext cx="6713317" cy="861774"/>
+          </a:xfrm>
+          <a:prstGeom prst="rect">
+            <a:avLst/>
+          </a:prstGeom>
+          <a:noFill/>
+        </p:spPr>
+        <p:txBody>
+          <a:bodyPr wrap="square" rtlCol="0">
+            <a:spAutoFit/>
+          </a:bodyPr>
+          <a:lstStyle/>
+          <a:p>
+            <a:r>
+              <a:rPr lang="en-US" sz="3200" b="1" dirty="0"/>
+              <a:t>Series Compensation- Series DC BUS</a:t>
+            </a:r>
+          </a:p>
+          <a:p>
+            <a:endParaRPr lang="en-US" dirty="0"/>
+          </a:p>
+        </p:txBody>
+      </p:sp>
+      <mc:AlternateContent xmlns:mc="http://schemas.openxmlformats.org/markup-compatibility/2006" xmlns:a14="http://schemas.microsoft.com/office/drawing/2010/main">
+        <mc:Choice Requires="a14">
+          <p:sp>
+            <p:nvSpPr>
+              <p:cNvPr id="5" name="TextBox 4">
+                <a:extLst>
+                  <a:ext uri="{FF2B5EF4-FFF2-40B4-BE49-F238E27FC236}">
+                    <a16:creationId xmlns:a16="http://schemas.microsoft.com/office/drawing/2014/main" id="{2C9A23E7-D786-40F7-9EDF-68E264C6281A}"/>
+                  </a:ext>
+                </a:extLst>
+              </p:cNvPr>
+              <p:cNvSpPr txBox="1"/>
+              <p:nvPr/>
+            </p:nvSpPr>
+            <p:spPr>
+              <a:xfrm>
+                <a:off x="4862096" y="2685327"/>
+                <a:ext cx="5312779" cy="553998"/>
+              </a:xfrm>
+              <a:prstGeom prst="rect">
+                <a:avLst/>
+              </a:prstGeom>
+              <a:noFill/>
+            </p:spPr>
+            <p:txBody>
+              <a:bodyPr wrap="square" rtlCol="0">
+                <a:spAutoFit/>
+              </a:bodyPr>
+              <a:lstStyle/>
+              <a:p>
+                <a:pPr/>
+                <a14:m>
+                  <m:oMathPara xmlns:m="http://schemas.openxmlformats.org/officeDocument/2006/math">
+                    <m:oMathParaPr>
+                      <m:jc m:val="centerGroup"/>
+                    </m:oMathParaPr>
+                    <m:oMath xmlns:m="http://schemas.openxmlformats.org/officeDocument/2006/math">
+                      <m:sSub>
+                        <m:sSubPr>
+                          <m:ctrlPr>
+                            <a:rPr lang="en-US" sz="3000" b="0" i="1" smtClean="0">
+                              <a:latin typeface="Cambria Math" panose="02040503050406030204" pitchFamily="18" charset="0"/>
+                            </a:rPr>
+                          </m:ctrlPr>
+                        </m:sSubPr>
+                        <m:e>
+                          <m:r>
+                            <a:rPr lang="en-US" sz="3000" b="0" i="0" smtClean="0">
+                              <a:latin typeface="Cambria Math" panose="02040503050406030204" pitchFamily="18" charset="0"/>
+                            </a:rPr>
+                            <m:t>|</m:t>
+                          </m:r>
+                          <m:r>
+                            <m:rPr>
+                              <m:sty m:val="p"/>
+                            </m:rPr>
+                            <a:rPr lang="en-US" sz="3000" b="0" i="0" smtClean="0">
+                              <a:latin typeface="Cambria Math" panose="02040503050406030204" pitchFamily="18" charset="0"/>
+                            </a:rPr>
+                            <m:t>I</m:t>
+                          </m:r>
+                        </m:e>
+                        <m:sub>
+                          <m:r>
+                            <m:rPr>
+                              <m:sty m:val="p"/>
+                            </m:rPr>
+                            <a:rPr lang="en-US" sz="3000" b="0" i="0" smtClean="0">
+                              <a:latin typeface="Cambria Math" panose="02040503050406030204" pitchFamily="18" charset="0"/>
+                            </a:rPr>
+                            <m:t>S</m:t>
+                          </m:r>
+                          <m:r>
+                            <a:rPr lang="en-US" sz="3000" b="0" i="0" smtClean="0">
+                              <a:latin typeface="Cambria Math" panose="02040503050406030204" pitchFamily="18" charset="0"/>
+                            </a:rPr>
+                            <m:t>1</m:t>
+                          </m:r>
+                        </m:sub>
+                      </m:sSub>
+                      <m:r>
+                        <a:rPr lang="en-US" sz="3000" b="0" i="1" smtClean="0">
+                          <a:latin typeface="Cambria Math" panose="02040503050406030204" pitchFamily="18" charset="0"/>
+                        </a:rPr>
+                        <m:t>|</m:t>
+                      </m:r>
+                      <m:r>
+                        <a:rPr lang="en-US" sz="3000" b="0" i="0" smtClean="0">
+                          <a:latin typeface="Cambria Math" panose="02040503050406030204" pitchFamily="18" charset="0"/>
+                        </a:rPr>
+                        <m:t>=</m:t>
+                      </m:r>
+                      <m:sSub>
+                        <m:sSubPr>
+                          <m:ctrlPr>
+                            <a:rPr lang="en-US" sz="3000" b="0" i="1" smtClean="0">
+                              <a:latin typeface="Cambria Math" panose="02040503050406030204" pitchFamily="18" charset="0"/>
+                            </a:rPr>
+                          </m:ctrlPr>
+                        </m:sSubPr>
+                        <m:e>
+                          <m:r>
+                            <a:rPr lang="en-US" sz="3000" b="0" i="0" smtClean="0">
+                              <a:latin typeface="Cambria Math" panose="02040503050406030204" pitchFamily="18" charset="0"/>
+                            </a:rPr>
+                            <m:t>|</m:t>
+                          </m:r>
+                          <m:r>
+                            <m:rPr>
+                              <m:sty m:val="p"/>
+                            </m:rPr>
+                            <a:rPr lang="en-US" sz="3000" b="0" i="0" smtClean="0">
+                              <a:latin typeface="Cambria Math" panose="02040503050406030204" pitchFamily="18" charset="0"/>
+                            </a:rPr>
+                            <m:t>I</m:t>
+                          </m:r>
+                        </m:e>
+                        <m:sub>
+                          <m:r>
+                            <m:rPr>
+                              <m:sty m:val="p"/>
+                            </m:rPr>
+                            <a:rPr lang="en-US" sz="3000" b="0" i="0" smtClean="0">
+                              <a:latin typeface="Cambria Math" panose="02040503050406030204" pitchFamily="18" charset="0"/>
+                            </a:rPr>
+                            <m:t>S</m:t>
+                          </m:r>
+                          <m:r>
+                            <a:rPr lang="en-US" sz="3000" b="0" i="0" smtClean="0">
+                              <a:latin typeface="Cambria Math" panose="02040503050406030204" pitchFamily="18" charset="0"/>
+                            </a:rPr>
+                            <m:t>2</m:t>
+                          </m:r>
+                        </m:sub>
+                      </m:sSub>
+                      <m:r>
+                        <a:rPr lang="en-US" sz="3000" b="0" i="1" smtClean="0">
+                          <a:latin typeface="Cambria Math" panose="02040503050406030204" pitchFamily="18" charset="0"/>
+                        </a:rPr>
+                        <m:t>|</m:t>
+                      </m:r>
+                      <m:r>
+                        <a:rPr lang="en-US" sz="3000" b="0" i="0" smtClean="0">
+                          <a:latin typeface="Cambria Math" panose="02040503050406030204" pitchFamily="18" charset="0"/>
+                        </a:rPr>
+                        <m:t>   ….(1)</m:t>
+                      </m:r>
+                    </m:oMath>
+                  </m:oMathPara>
+                </a14:m>
+                <a:endParaRPr lang="en-US" sz="3000" dirty="0"/>
+              </a:p>
+            </p:txBody>
+          </p:sp>
+        </mc:Choice>
+        <mc:Fallback xmlns="">
+          <p:sp>
+            <p:nvSpPr>
+              <p:cNvPr id="5" name="TextBox 4">
+                <a:extLst>
+                  <a:ext uri="{FF2B5EF4-FFF2-40B4-BE49-F238E27FC236}">
+                    <a16:creationId xmlns:a16="http://schemas.microsoft.com/office/drawing/2014/main" id="{2C9A23E7-D786-40F7-9EDF-68E264C6281A}"/>
+                  </a:ext>
+                </a:extLst>
+              </p:cNvPr>
+              <p:cNvSpPr txBox="1">
+                <a:spLocks noRot="1" noChangeAspect="1" noMove="1" noResize="1" noEditPoints="1" noAdjustHandles="1" noChangeArrowheads="1" noChangeShapeType="1" noTextEdit="1"/>
+              </p:cNvSpPr>
+              <p:nvPr/>
+            </p:nvSpPr>
+            <p:spPr>
+              <a:xfrm>
+                <a:off x="4862096" y="2685327"/>
+                <a:ext cx="5312779" cy="553998"/>
+              </a:xfrm>
+              <a:prstGeom prst="rect">
+                <a:avLst/>
+              </a:prstGeom>
+              <a:blipFill>
+                <a:blip r:embed="rId2"/>
+                <a:stretch>
+                  <a:fillRect/>
+                </a:stretch>
+              </a:blipFill>
+            </p:spPr>
+            <p:txBody>
+              <a:bodyPr/>
+              <a:lstStyle/>
+              <a:p>
+                <a:r>
+                  <a:rPr lang="en-US">
+                    <a:noFill/>
+                  </a:rPr>
+                  <a:t> </a:t>
+                </a:r>
+              </a:p>
+            </p:txBody>
+          </p:sp>
+        </mc:Fallback>
+      </mc:AlternateContent>
+      <p:pic>
+        <p:nvPicPr>
+          <p:cNvPr id="6" name="Picture 5">
+            <a:extLst>
+              <a:ext uri="{FF2B5EF4-FFF2-40B4-BE49-F238E27FC236}">
+                <a16:creationId xmlns:a16="http://schemas.microsoft.com/office/drawing/2014/main" id="{E59EBF45-E9B2-4ACF-83E4-8EA4E47E8CA4}"/>
+              </a:ext>
+            </a:extLst>
+          </p:cNvPr>
+          <p:cNvPicPr>
+            <a:picLocks noChangeAspect="1"/>
+          </p:cNvPicPr>
+          <p:nvPr/>
+        </p:nvPicPr>
+        <p:blipFill>
+          <a:blip r:embed="rId3"/>
+          <a:stretch>
+            <a:fillRect/>
+          </a:stretch>
+        </p:blipFill>
+        <p:spPr>
+          <a:xfrm>
+            <a:off x="1007428" y="1151141"/>
+            <a:ext cx="3379377" cy="5026180"/>
+          </a:xfrm>
+          <a:prstGeom prst="rect">
+            <a:avLst/>
+          </a:prstGeom>
+        </p:spPr>
+      </p:pic>
+      <mc:AlternateContent xmlns:mc="http://schemas.openxmlformats.org/markup-compatibility/2006" xmlns:a14="http://schemas.microsoft.com/office/drawing/2010/main">
+        <mc:Choice Requires="a14">
+          <p:sp>
+            <p:nvSpPr>
+              <p:cNvPr id="8" name="Rectangle 7">
+                <a:extLst>
+                  <a:ext uri="{FF2B5EF4-FFF2-40B4-BE49-F238E27FC236}">
+                    <a16:creationId xmlns:a16="http://schemas.microsoft.com/office/drawing/2014/main" id="{FAE97160-661F-4B1A-A686-6D5ED8C6F61E}"/>
+                  </a:ext>
+                </a:extLst>
+              </p:cNvPr>
+              <p:cNvSpPr/>
+              <p:nvPr/>
+            </p:nvSpPr>
+            <p:spPr>
+              <a:xfrm>
+                <a:off x="5748760" y="3778881"/>
+                <a:ext cx="3869008" cy="553998"/>
+              </a:xfrm>
+              <a:prstGeom prst="rect">
+                <a:avLst/>
+              </a:prstGeom>
+            </p:spPr>
+            <p:txBody>
+              <a:bodyPr wrap="none">
+                <a:spAutoFit/>
+              </a:bodyPr>
+              <a:lstStyle/>
+              <a:p>
+                <a:pPr/>
+                <a14:m>
+                  <m:oMathPara xmlns:m="http://schemas.openxmlformats.org/officeDocument/2006/math">
+                    <m:oMathParaPr>
+                      <m:jc m:val="centerGroup"/>
+                    </m:oMathParaPr>
+                    <m:oMath xmlns:m="http://schemas.openxmlformats.org/officeDocument/2006/math">
+                      <m:sSub>
+                        <m:sSubPr>
+                          <m:ctrlPr>
+                            <a:rPr lang="en-US" sz="3000" b="0" i="1" smtClean="0">
+                              <a:latin typeface="Cambria Math" panose="02040503050406030204" pitchFamily="18" charset="0"/>
+                            </a:rPr>
+                          </m:ctrlPr>
+                        </m:sSubPr>
+                        <m:e>
+                          <m:r>
+                            <m:rPr>
+                              <m:sty m:val="p"/>
+                            </m:rPr>
+                            <a:rPr lang="en-US" sz="3000" b="0" i="0" smtClean="0">
+                              <a:latin typeface="Cambria Math" panose="02040503050406030204" pitchFamily="18" charset="0"/>
+                            </a:rPr>
+                            <m:t>R</m:t>
+                          </m:r>
+                        </m:e>
+                        <m:sub>
+                          <m:r>
+                            <a:rPr lang="en-US" sz="3000" b="0" i="0" smtClean="0">
+                              <a:latin typeface="Cambria Math" panose="02040503050406030204" pitchFamily="18" charset="0"/>
+                            </a:rPr>
+                            <m:t>1</m:t>
+                          </m:r>
+                        </m:sub>
+                      </m:sSub>
+                      <m:r>
+                        <a:rPr lang="en-US" sz="3000" b="0" i="0" smtClean="0">
+                          <a:latin typeface="Cambria Math" panose="02040503050406030204" pitchFamily="18" charset="0"/>
+                        </a:rPr>
+                        <m:t>+</m:t>
+                      </m:r>
+                      <m:sSub>
+                        <m:sSubPr>
+                          <m:ctrlPr>
+                            <a:rPr lang="en-US" sz="3000" b="0" i="1" smtClean="0">
+                              <a:latin typeface="Cambria Math" panose="02040503050406030204" pitchFamily="18" charset="0"/>
+                            </a:rPr>
+                          </m:ctrlPr>
+                        </m:sSubPr>
+                        <m:e>
+                          <m:r>
+                            <m:rPr>
+                              <m:sty m:val="p"/>
+                            </m:rPr>
+                            <a:rPr lang="en-US" sz="3000" b="0" i="0" smtClean="0">
+                              <a:latin typeface="Cambria Math" panose="02040503050406030204" pitchFamily="18" charset="0"/>
+                            </a:rPr>
+                            <m:t>R</m:t>
+                          </m:r>
+                        </m:e>
+                        <m:sub>
+                          <m:r>
+                            <a:rPr lang="en-US" sz="3000" b="0" i="0" smtClean="0">
+                              <a:latin typeface="Cambria Math" panose="02040503050406030204" pitchFamily="18" charset="0"/>
+                            </a:rPr>
+                            <m:t>2</m:t>
+                          </m:r>
+                        </m:sub>
+                      </m:sSub>
+                      <m:r>
+                        <a:rPr lang="en-US" sz="3000" b="0" i="0" smtClean="0">
+                          <a:latin typeface="Cambria Math" panose="02040503050406030204" pitchFamily="18" charset="0"/>
+                        </a:rPr>
+                        <m:t>=</m:t>
+                      </m:r>
+                      <m:sSub>
+                        <m:sSubPr>
+                          <m:ctrlPr>
+                            <a:rPr lang="en-US" sz="3000" b="0" i="1" smtClean="0">
+                              <a:latin typeface="Cambria Math" panose="02040503050406030204" pitchFamily="18" charset="0"/>
+                            </a:rPr>
+                          </m:ctrlPr>
+                        </m:sSubPr>
+                        <m:e>
+                          <m:r>
+                            <m:rPr>
+                              <m:sty m:val="p"/>
+                            </m:rPr>
+                            <a:rPr lang="en-US" sz="3000" b="0" i="0" smtClean="0">
+                              <a:latin typeface="Cambria Math" panose="02040503050406030204" pitchFamily="18" charset="0"/>
+                            </a:rPr>
+                            <m:t>R</m:t>
+                          </m:r>
+                        </m:e>
+                        <m:sub>
+                          <m:r>
+                            <m:rPr>
+                              <m:sty m:val="p"/>
+                            </m:rPr>
+                            <a:rPr lang="en-US" sz="3000" b="0" i="0" smtClean="0">
+                              <a:latin typeface="Cambria Math" panose="02040503050406030204" pitchFamily="18" charset="0"/>
+                            </a:rPr>
+                            <m:t>L</m:t>
+                          </m:r>
+                        </m:sub>
+                      </m:sSub>
+                      <m:r>
+                        <a:rPr lang="en-US" sz="3000" b="0" i="0" smtClean="0">
+                          <a:latin typeface="Cambria Math" panose="02040503050406030204" pitchFamily="18" charset="0"/>
+                        </a:rPr>
+                        <m:t>   …. (2)</m:t>
+                      </m:r>
+                    </m:oMath>
+                  </m:oMathPara>
+                </a14:m>
+                <a:endParaRPr lang="en-US" sz="3000" dirty="0"/>
+              </a:p>
+            </p:txBody>
+          </p:sp>
+        </mc:Choice>
+        <mc:Fallback xmlns="">
+          <p:sp>
+            <p:nvSpPr>
+              <p:cNvPr id="8" name="Rectangle 7">
+                <a:extLst>
+                  <a:ext uri="{FF2B5EF4-FFF2-40B4-BE49-F238E27FC236}">
+                    <a16:creationId xmlns:a16="http://schemas.microsoft.com/office/drawing/2014/main" id="{FAE97160-661F-4B1A-A686-6D5ED8C6F61E}"/>
+                  </a:ext>
+                </a:extLst>
+              </p:cNvPr>
+              <p:cNvSpPr>
+                <a:spLocks noRot="1" noChangeAspect="1" noMove="1" noResize="1" noEditPoints="1" noAdjustHandles="1" noChangeArrowheads="1" noChangeShapeType="1" noTextEdit="1"/>
+              </p:cNvSpPr>
+              <p:nvPr/>
+            </p:nvSpPr>
+            <p:spPr>
+              <a:xfrm>
+                <a:off x="5748760" y="3778881"/>
+                <a:ext cx="3869008" cy="553998"/>
+              </a:xfrm>
+              <a:prstGeom prst="rect">
+                <a:avLst/>
+              </a:prstGeom>
+              <a:blipFill>
+                <a:blip r:embed="rId4"/>
+                <a:stretch>
+                  <a:fillRect/>
+                </a:stretch>
+              </a:blipFill>
+            </p:spPr>
+            <p:txBody>
+              <a:bodyPr/>
+              <a:lstStyle/>
+              <a:p>
+                <a:r>
+                  <a:rPr lang="en-US">
+                    <a:noFill/>
+                  </a:rPr>
+                  <a:t> </a:t>
+                </a:r>
+              </a:p>
+            </p:txBody>
+          </p:sp>
+        </mc:Fallback>
+      </mc:AlternateContent>
+    </p:spTree>
+    <p:extLst>
+      <p:ext uri="{BB962C8B-B14F-4D97-AF65-F5344CB8AC3E}">
+        <p14:creationId xmlns:p14="http://schemas.microsoft.com/office/powerpoint/2010/main" val="2249130011"/>
+      </p:ext>
+    </p:extLst>
+  </p:cSld>
+  <p:clrMapOvr>
+    <a:masterClrMapping/>
+  </p:clrMapOvr>
+</p:sld>
+</file>
+
+<file path=ppt/slides/slide11.xml><?xml version="1.0" encoding="utf-8"?>
+<p:sld xmlns:a="http://schemas.openxmlformats.org/drawingml/2006/main" xmlns:r="http://schemas.openxmlformats.org/officeDocument/2006/relationships" xmlns:p="http://schemas.openxmlformats.org/presentationml/2006/main">
+  <p:cSld>
+    <p:spTree>
+      <p:nvGrpSpPr>
+        <p:cNvPr id="1" name=""/>
+        <p:cNvGrpSpPr/>
+        <p:nvPr/>
+      </p:nvGrpSpPr>
+      <p:grpSpPr>
+        <a:xfrm>
+          <a:off x="0" y="0"/>
+          <a:ext cx="0" cy="0"/>
+          <a:chOff x="0" y="0"/>
+          <a:chExt cx="0" cy="0"/>
+        </a:xfrm>
+      </p:grpSpPr>
       <mc:AlternateContent xmlns:mc="http://schemas.openxmlformats.org/markup-compatibility/2006" xmlns:a14="http://schemas.microsoft.com/office/drawing/2010/main">
         <mc:Choice Requires="a14">
           <p:sp>
@@ -4758,7 +5251,7 @@
 </p:sld>
 </file>
 
-<file path=ppt/slides/slide11.xml><?xml version="1.0" encoding="utf-8"?>
+<file path=ppt/slides/slide12.xml><?xml version="1.0" encoding="utf-8"?>
 <p:sld xmlns:a="http://schemas.openxmlformats.org/drawingml/2006/main" xmlns:r="http://schemas.openxmlformats.org/officeDocument/2006/relationships" xmlns:p="http://schemas.openxmlformats.org/presentationml/2006/main">
   <p:cSld>
     <p:spTree>
@@ -6805,7 +7298,7 @@
 </p:sld>
 </file>
 
-<file path=ppt/slides/slide12.xml><?xml version="1.0" encoding="utf-8"?>
+<file path=ppt/slides/slide13.xml><?xml version="1.0" encoding="utf-8"?>
 <p:sld xmlns:a="http://schemas.openxmlformats.org/drawingml/2006/main" xmlns:r="http://schemas.openxmlformats.org/officeDocument/2006/relationships" xmlns:p="http://schemas.openxmlformats.org/presentationml/2006/main">
   <p:cSld>
     <p:spTree>
@@ -7828,7 +8321,7 @@
 </p:sld>
 </file>
 
-<file path=ppt/slides/slide13.xml><?xml version="1.0" encoding="utf-8"?>
+<file path=ppt/slides/slide14.xml><?xml version="1.0" encoding="utf-8"?>
 <p:sld xmlns:a="http://schemas.openxmlformats.org/drawingml/2006/main" xmlns:r="http://schemas.openxmlformats.org/officeDocument/2006/relationships" xmlns:p="http://schemas.openxmlformats.org/presentationml/2006/main">
   <p:cSld>
     <p:spTree>
@@ -7888,7 +8381,7 @@
 </p:sld>
 </file>
 
-<file path=ppt/slides/slide14.xml><?xml version="1.0" encoding="utf-8"?>
+<file path=ppt/slides/slide15.xml><?xml version="1.0" encoding="utf-8"?>
 <p:sld xmlns:a="http://schemas.openxmlformats.org/drawingml/2006/main" xmlns:r="http://schemas.openxmlformats.org/officeDocument/2006/relationships" xmlns:p="http://schemas.openxmlformats.org/presentationml/2006/main">
   <p:cSld>
     <p:spTree>
@@ -8607,7 +9100,7 @@
 </p:sld>
 </file>
 
-<file path=ppt/slides/slide15.xml><?xml version="1.0" encoding="utf-8"?>
+<file path=ppt/slides/slide16.xml><?xml version="1.0" encoding="utf-8"?>
 <p:sld xmlns:a="http://schemas.openxmlformats.org/drawingml/2006/main" xmlns:r="http://schemas.openxmlformats.org/officeDocument/2006/relationships" xmlns:p="http://schemas.openxmlformats.org/presentationml/2006/main">
   <p:cSld>
     <p:spTree>
@@ -10055,7 +10548,7 @@
 </p:sld>
 </file>
 
-<file path=ppt/slides/slide16.xml><?xml version="1.0" encoding="utf-8"?>
+<file path=ppt/slides/slide17.xml><?xml version="1.0" encoding="utf-8"?>
 <p:sld xmlns:a="http://schemas.openxmlformats.org/drawingml/2006/main" xmlns:r="http://schemas.openxmlformats.org/officeDocument/2006/relationships" xmlns:p="http://schemas.openxmlformats.org/presentationml/2006/main">
   <p:cSld>
     <p:spTree>
@@ -13132,7 +13625,7 @@
 </p:sld>
 </file>
 
-<file path=ppt/slides/slide17.xml><?xml version="1.0" encoding="utf-8"?>
+<file path=ppt/slides/slide18.xml><?xml version="1.0" encoding="utf-8"?>
 <p:sld xmlns:a="http://schemas.openxmlformats.org/drawingml/2006/main" xmlns:r="http://schemas.openxmlformats.org/officeDocument/2006/relationships" xmlns:p="http://schemas.openxmlformats.org/presentationml/2006/main">
   <p:cSld>
     <p:spTree>
@@ -15770,7 +16263,7 @@
 </p:sld>
 </file>
 
-<file path=ppt/slides/slide18.xml><?xml version="1.0" encoding="utf-8"?>
+<file path=ppt/slides/slide19.xml><?xml version="1.0" encoding="utf-8"?>
 <p:sld xmlns:a="http://schemas.openxmlformats.org/drawingml/2006/main" xmlns:r="http://schemas.openxmlformats.org/officeDocument/2006/relationships" xmlns:p="http://schemas.openxmlformats.org/presentationml/2006/main">
   <p:cSld>
     <p:spTree>
@@ -17019,66 +17512,6 @@
 </p:sld>
 </file>
 
-<file path=ppt/slides/slide19.xml><?xml version="1.0" encoding="utf-8"?>
-<p:sld xmlns:a="http://schemas.openxmlformats.org/drawingml/2006/main" xmlns:r="http://schemas.openxmlformats.org/officeDocument/2006/relationships" xmlns:p="http://schemas.openxmlformats.org/presentationml/2006/main">
-  <p:cSld>
-    <p:spTree>
-      <p:nvGrpSpPr>
-        <p:cNvPr id="1" name=""/>
-        <p:cNvGrpSpPr/>
-        <p:nvPr/>
-      </p:nvGrpSpPr>
-      <p:grpSpPr>
-        <a:xfrm>
-          <a:off x="0" y="0"/>
-          <a:ext cx="0" cy="0"/>
-          <a:chOff x="0" y="0"/>
-          <a:chExt cx="0" cy="0"/>
-        </a:xfrm>
-      </p:grpSpPr>
-      <p:pic>
-        <p:nvPicPr>
-          <p:cNvPr id="2" name="Picture 1">
-            <a:extLst>
-              <a:ext uri="{FF2B5EF4-FFF2-40B4-BE49-F238E27FC236}">
-                <a16:creationId xmlns:a16="http://schemas.microsoft.com/office/drawing/2014/main" id="{03D5178A-820C-4EBC-B275-D0705DB67FA5}"/>
-              </a:ext>
-            </a:extLst>
-          </p:cNvPr>
-          <p:cNvPicPr>
-            <a:picLocks noChangeAspect="1"/>
-          </p:cNvPicPr>
-          <p:nvPr/>
-        </p:nvPicPr>
-        <p:blipFill>
-          <a:blip r:embed="rId2"/>
-          <a:stretch>
-            <a:fillRect/>
-          </a:stretch>
-        </p:blipFill>
-        <p:spPr>
-          <a:xfrm>
-            <a:off x="-115255" y="532660"/>
-            <a:ext cx="11827860" cy="5408782"/>
-          </a:xfrm>
-          <a:prstGeom prst="rect">
-            <a:avLst/>
-          </a:prstGeom>
-        </p:spPr>
-      </p:pic>
-    </p:spTree>
-    <p:extLst>
-      <p:ext uri="{BB962C8B-B14F-4D97-AF65-F5344CB8AC3E}">
-        <p14:creationId xmlns:p14="http://schemas.microsoft.com/office/powerpoint/2010/main" val="287545012"/>
-      </p:ext>
-    </p:extLst>
-  </p:cSld>
-  <p:clrMapOvr>
-    <a:masterClrMapping/>
-  </p:clrMapOvr>
-</p:sld>
-</file>
-
 <file path=ppt/slides/slide2.xml><?xml version="1.0" encoding="utf-8"?>
 <p:sld xmlns:a="http://schemas.openxmlformats.org/drawingml/2006/main" xmlns:r="http://schemas.openxmlformats.org/officeDocument/2006/relationships" xmlns:p="http://schemas.openxmlformats.org/presentationml/2006/main">
   <p:cSld>
@@ -17247,6 +17680,66 @@
           <p:cNvPr id="2" name="Picture 1">
             <a:extLst>
               <a:ext uri="{FF2B5EF4-FFF2-40B4-BE49-F238E27FC236}">
+                <a16:creationId xmlns:a16="http://schemas.microsoft.com/office/drawing/2014/main" id="{03D5178A-820C-4EBC-B275-D0705DB67FA5}"/>
+              </a:ext>
+            </a:extLst>
+          </p:cNvPr>
+          <p:cNvPicPr>
+            <a:picLocks noChangeAspect="1"/>
+          </p:cNvPicPr>
+          <p:nvPr/>
+        </p:nvPicPr>
+        <p:blipFill>
+          <a:blip r:embed="rId2"/>
+          <a:stretch>
+            <a:fillRect/>
+          </a:stretch>
+        </p:blipFill>
+        <p:spPr>
+          <a:xfrm>
+            <a:off x="-115255" y="532660"/>
+            <a:ext cx="11827860" cy="5408782"/>
+          </a:xfrm>
+          <a:prstGeom prst="rect">
+            <a:avLst/>
+          </a:prstGeom>
+        </p:spPr>
+      </p:pic>
+    </p:spTree>
+    <p:extLst>
+      <p:ext uri="{BB962C8B-B14F-4D97-AF65-F5344CB8AC3E}">
+        <p14:creationId xmlns:p14="http://schemas.microsoft.com/office/powerpoint/2010/main" val="287545012"/>
+      </p:ext>
+    </p:extLst>
+  </p:cSld>
+  <p:clrMapOvr>
+    <a:masterClrMapping/>
+  </p:clrMapOvr>
+</p:sld>
+</file>
+
+<file path=ppt/slides/slide21.xml><?xml version="1.0" encoding="utf-8"?>
+<p:sld xmlns:a="http://schemas.openxmlformats.org/drawingml/2006/main" xmlns:r="http://schemas.openxmlformats.org/officeDocument/2006/relationships" xmlns:p="http://schemas.openxmlformats.org/presentationml/2006/main">
+  <p:cSld>
+    <p:spTree>
+      <p:nvGrpSpPr>
+        <p:cNvPr id="1" name=""/>
+        <p:cNvGrpSpPr/>
+        <p:nvPr/>
+      </p:nvGrpSpPr>
+      <p:grpSpPr>
+        <a:xfrm>
+          <a:off x="0" y="0"/>
+          <a:ext cx="0" cy="0"/>
+          <a:chOff x="0" y="0"/>
+          <a:chExt cx="0" cy="0"/>
+        </a:xfrm>
+      </p:grpSpPr>
+      <p:pic>
+        <p:nvPicPr>
+          <p:cNvPr id="2" name="Picture 1">
+            <a:extLst>
+              <a:ext uri="{FF2B5EF4-FFF2-40B4-BE49-F238E27FC236}">
                 <a16:creationId xmlns:a16="http://schemas.microsoft.com/office/drawing/2014/main" id="{45B405EE-B326-4071-A1EF-DC706BD5910F}"/>
               </a:ext>
             </a:extLst>
@@ -17272,8 +17765,8 @@
           </a:prstGeom>
         </p:spPr>
       </p:pic>
-      <mc:AlternateContent xmlns:mc="http://schemas.openxmlformats.org/markup-compatibility/2006">
-        <mc:Choice xmlns:a14="http://schemas.microsoft.com/office/drawing/2010/main" Requires="a14">
+      <mc:AlternateContent xmlns:mc="http://schemas.openxmlformats.org/markup-compatibility/2006" xmlns:a14="http://schemas.microsoft.com/office/drawing/2010/main">
+        <mc:Choice Requires="a14">
           <p:sp>
             <p:nvSpPr>
               <p:cNvPr id="3" name="TextBox 2">
@@ -17406,7 +17899,7 @@
             </p:txBody>
           </p:sp>
         </mc:Choice>
-        <mc:Fallback>
+        <mc:Fallback xmlns="">
           <p:sp>
             <p:nvSpPr>
               <p:cNvPr id="3" name="TextBox 2">
@@ -17451,8 +17944,8 @@
           </p:sp>
         </mc:Fallback>
       </mc:AlternateContent>
-      <mc:AlternateContent xmlns:mc="http://schemas.openxmlformats.org/markup-compatibility/2006">
-        <mc:Choice xmlns:a14="http://schemas.microsoft.com/office/drawing/2010/main" Requires="a14">
+      <mc:AlternateContent xmlns:mc="http://schemas.openxmlformats.org/markup-compatibility/2006" xmlns:a14="http://schemas.microsoft.com/office/drawing/2010/main">
+        <mc:Choice Requires="a14">
           <p:sp>
             <p:nvSpPr>
               <p:cNvPr id="4" name="Rectangle 3">
@@ -17594,7 +18087,7 @@
             </p:txBody>
           </p:sp>
         </mc:Choice>
-        <mc:Fallback>
+        <mc:Fallback xmlns="">
           <p:sp>
             <p:nvSpPr>
               <p:cNvPr id="4" name="Rectangle 3">
@@ -17639,8 +18132,8 @@
           </p:sp>
         </mc:Fallback>
       </mc:AlternateContent>
-      <mc:AlternateContent xmlns:mc="http://schemas.openxmlformats.org/markup-compatibility/2006">
-        <mc:Choice xmlns:a14="http://schemas.microsoft.com/office/drawing/2010/main" Requires="a14">
+      <mc:AlternateContent xmlns:mc="http://schemas.openxmlformats.org/markup-compatibility/2006" xmlns:a14="http://schemas.microsoft.com/office/drawing/2010/main">
+        <mc:Choice Requires="a14">
           <p:sp>
             <p:nvSpPr>
               <p:cNvPr id="5" name="Rectangle 4">
@@ -17848,7 +18341,7 @@
             </p:txBody>
           </p:sp>
         </mc:Choice>
-        <mc:Fallback>
+        <mc:Fallback xmlns="">
           <p:sp>
             <p:nvSpPr>
               <p:cNvPr id="5" name="Rectangle 4">
@@ -17944,7 +18437,7 @@
 </p:sld>
 </file>
 
-<file path=ppt/slides/slide21.xml><?xml version="1.0" encoding="utf-8"?>
+<file path=ppt/slides/slide22.xml><?xml version="1.0" encoding="utf-8"?>
 <p:sld xmlns:a="http://schemas.openxmlformats.org/drawingml/2006/main" xmlns:r="http://schemas.openxmlformats.org/officeDocument/2006/relationships" xmlns:p="http://schemas.openxmlformats.org/presentationml/2006/main">
   <p:cSld>
     <p:spTree>
@@ -17961,8 +18454,8 @@
           <a:chExt cx="0" cy="0"/>
         </a:xfrm>
       </p:grpSpPr>
-      <mc:AlternateContent xmlns:mc="http://schemas.openxmlformats.org/markup-compatibility/2006">
-        <mc:Choice xmlns:a14="http://schemas.microsoft.com/office/drawing/2010/main" Requires="a14">
+      <mc:AlternateContent xmlns:mc="http://schemas.openxmlformats.org/markup-compatibility/2006" xmlns:a14="http://schemas.microsoft.com/office/drawing/2010/main">
+        <mc:Choice Requires="a14">
           <p:sp>
             <p:nvSpPr>
               <p:cNvPr id="3" name="TextBox 2">
@@ -18270,7 +18763,7 @@
             </p:txBody>
           </p:sp>
         </mc:Choice>
-        <mc:Fallback>
+        <mc:Fallback xmlns="">
           <p:sp>
             <p:nvSpPr>
               <p:cNvPr id="3" name="TextBox 2">
@@ -18315,8 +18808,8 @@
           </p:sp>
         </mc:Fallback>
       </mc:AlternateContent>
-      <mc:AlternateContent xmlns:mc="http://schemas.openxmlformats.org/markup-compatibility/2006">
-        <mc:Choice xmlns:a14="http://schemas.microsoft.com/office/drawing/2010/main" Requires="a14">
+      <mc:AlternateContent xmlns:mc="http://schemas.openxmlformats.org/markup-compatibility/2006" xmlns:a14="http://schemas.microsoft.com/office/drawing/2010/main">
+        <mc:Choice Requires="a14">
           <p:sp>
             <p:nvSpPr>
               <p:cNvPr id="4" name="TextBox 3">
@@ -18624,7 +19117,7 @@
             </p:txBody>
           </p:sp>
         </mc:Choice>
-        <mc:Fallback>
+        <mc:Fallback xmlns="">
           <p:sp>
             <p:nvSpPr>
               <p:cNvPr id="4" name="TextBox 3">
@@ -18704,8 +19197,8 @@
           </a:p>
         </p:txBody>
       </p:sp>
-      <mc:AlternateContent xmlns:mc="http://schemas.openxmlformats.org/markup-compatibility/2006">
-        <mc:Choice xmlns:a14="http://schemas.microsoft.com/office/drawing/2010/main" Requires="a14">
+      <mc:AlternateContent xmlns:mc="http://schemas.openxmlformats.org/markup-compatibility/2006" xmlns:a14="http://schemas.microsoft.com/office/drawing/2010/main">
+        <mc:Choice Requires="a14">
           <p:sp>
             <p:nvSpPr>
               <p:cNvPr id="6" name="TextBox 5">
@@ -19043,7 +19536,7 @@
             </p:txBody>
           </p:sp>
         </mc:Choice>
-        <mc:Fallback>
+        <mc:Fallback xmlns="">
           <p:sp>
             <p:nvSpPr>
               <p:cNvPr id="6" name="TextBox 5">
@@ -19088,8 +19581,8 @@
           </p:sp>
         </mc:Fallback>
       </mc:AlternateContent>
-      <mc:AlternateContent xmlns:mc="http://schemas.openxmlformats.org/markup-compatibility/2006">
-        <mc:Choice xmlns:a14="http://schemas.microsoft.com/office/drawing/2010/main" Requires="a14">
+      <mc:AlternateContent xmlns:mc="http://schemas.openxmlformats.org/markup-compatibility/2006" xmlns:a14="http://schemas.microsoft.com/office/drawing/2010/main">
+        <mc:Choice Requires="a14">
           <p:sp>
             <p:nvSpPr>
               <p:cNvPr id="10" name="TextBox 9">
@@ -19307,7 +19800,7 @@
             </p:txBody>
           </p:sp>
         </mc:Choice>
-        <mc:Fallback>
+        <mc:Fallback xmlns="">
           <p:sp>
             <p:nvSpPr>
               <p:cNvPr id="10" name="TextBox 9">
@@ -19365,7 +19858,7 @@
 </p:sld>
 </file>
 
-<file path=ppt/slides/slide22.xml><?xml version="1.0" encoding="utf-8"?>
+<file path=ppt/slides/slide23.xml><?xml version="1.0" encoding="utf-8"?>
 <p:sld xmlns:a="http://schemas.openxmlformats.org/drawingml/2006/main" xmlns:r="http://schemas.openxmlformats.org/officeDocument/2006/relationships" xmlns:p="http://schemas.openxmlformats.org/presentationml/2006/main">
   <p:cSld>
     <p:spTree>
@@ -22442,7 +22935,7 @@
 </p:sld>
 </file>
 
-<file path=ppt/slides/slide23.xml><?xml version="1.0" encoding="utf-8"?>
+<file path=ppt/slides/slide24.xml><?xml version="1.0" encoding="utf-8"?>
 <p:sld xmlns:a="http://schemas.openxmlformats.org/drawingml/2006/main" xmlns:r="http://schemas.openxmlformats.org/officeDocument/2006/relationships" xmlns:p="http://schemas.openxmlformats.org/presentationml/2006/main">
   <p:cSld>
     <p:spTree>
@@ -25080,7 +25573,7 @@
 </p:sld>
 </file>
 
-<file path=ppt/slides/slide24.xml><?xml version="1.0" encoding="utf-8"?>
+<file path=ppt/slides/slide25.xml><?xml version="1.0" encoding="utf-8"?>
 <p:sld xmlns:a="http://schemas.openxmlformats.org/drawingml/2006/main" xmlns:r="http://schemas.openxmlformats.org/officeDocument/2006/relationships" xmlns:p="http://schemas.openxmlformats.org/presentationml/2006/main">
   <p:cSld>
     <p:spTree>
@@ -26329,7 +26822,7 @@
 </p:sld>
 </file>
 
-<file path=ppt/slides/slide25.xml><?xml version="1.0" encoding="utf-8"?>
+<file path=ppt/slides/slide26.xml><?xml version="1.0" encoding="utf-8"?>
 <p:sld xmlns:a="http://schemas.openxmlformats.org/drawingml/2006/main" xmlns:r="http://schemas.openxmlformats.org/officeDocument/2006/relationships" xmlns:p="http://schemas.openxmlformats.org/presentationml/2006/main">
   <p:cSld>
     <p:spTree>
@@ -26389,7 +26882,7 @@
 </p:sld>
 </file>
 
-<file path=ppt/slides/slide26.xml><?xml version="1.0" encoding="utf-8"?>
+<file path=ppt/slides/slide27.xml><?xml version="1.0" encoding="utf-8"?>
 <p:sld xmlns:a="http://schemas.openxmlformats.org/drawingml/2006/main" xmlns:r="http://schemas.openxmlformats.org/officeDocument/2006/relationships" xmlns:p="http://schemas.openxmlformats.org/presentationml/2006/main">
   <p:cSld>
     <p:spTree>
@@ -26444,8 +26937,8 @@
           </a:p>
         </p:txBody>
       </p:sp>
-      <mc:AlternateContent xmlns:mc="http://schemas.openxmlformats.org/markup-compatibility/2006">
-        <mc:Choice xmlns:a14="http://schemas.microsoft.com/office/drawing/2010/main" Requires="a14">
+      <mc:AlternateContent xmlns:mc="http://schemas.openxmlformats.org/markup-compatibility/2006" xmlns:a14="http://schemas.microsoft.com/office/drawing/2010/main">
+        <mc:Choice Requires="a14">
           <p:sp>
             <p:nvSpPr>
               <p:cNvPr id="5" name="TextBox 4">
@@ -26599,7 +27092,7 @@
             </p:txBody>
           </p:sp>
         </mc:Choice>
-        <mc:Fallback>
+        <mc:Fallback xmlns="">
           <p:sp>
             <p:nvSpPr>
               <p:cNvPr id="5" name="TextBox 4">
@@ -26881,7 +27374,7 @@
 </p:sld>
 </file>
 
-<file path=ppt/slides/slide27.xml><?xml version="1.0" encoding="utf-8"?>
+<file path=ppt/slides/slide28.xml><?xml version="1.0" encoding="utf-8"?>
 <p:sld xmlns:a="http://schemas.openxmlformats.org/drawingml/2006/main" xmlns:r="http://schemas.openxmlformats.org/officeDocument/2006/relationships" xmlns:p="http://schemas.openxmlformats.org/presentationml/2006/main">
   <p:cSld>
     <p:spTree>
@@ -26911,7 +27404,7 @@
 </p:sld>
 </file>
 
-<file path=ppt/slides/slide28.xml><?xml version="1.0" encoding="utf-8"?>
+<file path=ppt/slides/slide29.xml><?xml version="1.0" encoding="utf-8"?>
 <p:sld xmlns:a="http://schemas.openxmlformats.org/drawingml/2006/main" xmlns:r="http://schemas.openxmlformats.org/officeDocument/2006/relationships" xmlns:p="http://schemas.openxmlformats.org/presentationml/2006/main">
   <p:cSld>
     <p:spTree>
@@ -26932,36 +27425,6 @@
     <p:extLst>
       <p:ext uri="{BB962C8B-B14F-4D97-AF65-F5344CB8AC3E}">
         <p14:creationId xmlns:p14="http://schemas.microsoft.com/office/powerpoint/2010/main" val="603785960"/>
-      </p:ext>
-    </p:extLst>
-  </p:cSld>
-  <p:clrMapOvr>
-    <a:masterClrMapping/>
-  </p:clrMapOvr>
-</p:sld>
-</file>
-
-<file path=ppt/slides/slide29.xml><?xml version="1.0" encoding="utf-8"?>
-<p:sld xmlns:a="http://schemas.openxmlformats.org/drawingml/2006/main" xmlns:r="http://schemas.openxmlformats.org/officeDocument/2006/relationships" xmlns:p="http://schemas.openxmlformats.org/presentationml/2006/main">
-  <p:cSld>
-    <p:spTree>
-      <p:nvGrpSpPr>
-        <p:cNvPr id="1" name=""/>
-        <p:cNvGrpSpPr/>
-        <p:nvPr/>
-      </p:nvGrpSpPr>
-      <p:grpSpPr>
-        <a:xfrm>
-          <a:off x="0" y="0"/>
-          <a:ext cx="0" cy="0"/>
-          <a:chOff x="0" y="0"/>
-          <a:chExt cx="0" cy="0"/>
-        </a:xfrm>
-      </p:grpSpPr>
-    </p:spTree>
-    <p:extLst>
-      <p:ext uri="{BB962C8B-B14F-4D97-AF65-F5344CB8AC3E}">
-        <p14:creationId xmlns:p14="http://schemas.microsoft.com/office/powerpoint/2010/main" val="3375389220"/>
       </p:ext>
     </p:extLst>
   </p:cSld>
@@ -27421,7 +27884,7 @@
         </p:blipFill>
         <p:spPr>
           <a:xfrm>
-            <a:off x="1691156" y="2148862"/>
+            <a:off x="1594072" y="2106752"/>
             <a:ext cx="3625990" cy="1890704"/>
           </a:xfrm>
           <a:prstGeom prst="rect">
@@ -27567,7 +28030,7 @@
     </p:spTree>
     <p:extLst>
       <p:ext uri="{BB962C8B-B14F-4D97-AF65-F5344CB8AC3E}">
-        <p14:creationId xmlns:p14="http://schemas.microsoft.com/office/powerpoint/2010/main" val="4255871978"/>
+        <p14:creationId xmlns:p14="http://schemas.microsoft.com/office/powerpoint/2010/main" val="3375389220"/>
       </p:ext>
     </p:extLst>
   </p:cSld>
@@ -27597,6 +28060,36 @@
     </p:spTree>
     <p:extLst>
       <p:ext uri="{BB962C8B-B14F-4D97-AF65-F5344CB8AC3E}">
+        <p14:creationId xmlns:p14="http://schemas.microsoft.com/office/powerpoint/2010/main" val="4255871978"/>
+      </p:ext>
+    </p:extLst>
+  </p:cSld>
+  <p:clrMapOvr>
+    <a:masterClrMapping/>
+  </p:clrMapOvr>
+</p:sld>
+</file>
+
+<file path=ppt/slides/slide32.xml><?xml version="1.0" encoding="utf-8"?>
+<p:sld xmlns:a="http://schemas.openxmlformats.org/drawingml/2006/main" xmlns:r="http://schemas.openxmlformats.org/officeDocument/2006/relationships" xmlns:p="http://schemas.openxmlformats.org/presentationml/2006/main">
+  <p:cSld>
+    <p:spTree>
+      <p:nvGrpSpPr>
+        <p:cNvPr id="1" name=""/>
+        <p:cNvGrpSpPr/>
+        <p:nvPr/>
+      </p:nvGrpSpPr>
+      <p:grpSpPr>
+        <a:xfrm>
+          <a:off x="0" y="0"/>
+          <a:ext cx="0" cy="0"/>
+          <a:chOff x="0" y="0"/>
+          <a:chExt cx="0" cy="0"/>
+        </a:xfrm>
+      </p:grpSpPr>
+    </p:spTree>
+    <p:extLst>
+      <p:ext uri="{BB962C8B-B14F-4D97-AF65-F5344CB8AC3E}">
         <p14:creationId xmlns:p14="http://schemas.microsoft.com/office/powerpoint/2010/main" val="154698098"/>
       </p:ext>
     </p:extLst>
@@ -27607,7 +28100,7 @@
 </p:sld>
 </file>
 
-<file path=ppt/slides/slide32.xml><?xml version="1.0" encoding="utf-8"?>
+<file path=ppt/slides/slide33.xml><?xml version="1.0" encoding="utf-8"?>
 <p:sld xmlns:a="http://schemas.openxmlformats.org/drawingml/2006/main" xmlns:r="http://schemas.openxmlformats.org/officeDocument/2006/relationships" xmlns:p="http://schemas.openxmlformats.org/presentationml/2006/main">
   <p:cSld>
     <p:spTree>
@@ -27638,6 +28131,575 @@
 </file>
 
 <file path=ppt/slides/slide4.xml><?xml version="1.0" encoding="utf-8"?>
+<p:sld xmlns:a="http://schemas.openxmlformats.org/drawingml/2006/main" xmlns:r="http://schemas.openxmlformats.org/officeDocument/2006/relationships" xmlns:p="http://schemas.openxmlformats.org/presentationml/2006/main">
+  <p:cSld>
+    <p:spTree>
+      <p:nvGrpSpPr>
+        <p:cNvPr id="1" name=""/>
+        <p:cNvGrpSpPr/>
+        <p:nvPr/>
+      </p:nvGrpSpPr>
+      <p:grpSpPr>
+        <a:xfrm>
+          <a:off x="0" y="0"/>
+          <a:ext cx="0" cy="0"/>
+          <a:chOff x="0" y="0"/>
+          <a:chExt cx="0" cy="0"/>
+        </a:xfrm>
+      </p:grpSpPr>
+      <p:sp>
+        <p:nvSpPr>
+          <p:cNvPr id="2" name="TextBox 1">
+            <a:extLst>
+              <a:ext uri="{FF2B5EF4-FFF2-40B4-BE49-F238E27FC236}">
+                <a16:creationId xmlns:a16="http://schemas.microsoft.com/office/drawing/2014/main" id="{4B522187-454D-4A33-AFBC-E9DEE8B327E7}"/>
+              </a:ext>
+            </a:extLst>
+          </p:cNvPr>
+          <p:cNvSpPr txBox="1"/>
+          <p:nvPr/>
+        </p:nvSpPr>
+        <p:spPr>
+          <a:xfrm>
+            <a:off x="4438834" y="541538"/>
+            <a:ext cx="4190261" cy="523220"/>
+          </a:xfrm>
+          <a:prstGeom prst="rect">
+            <a:avLst/>
+          </a:prstGeom>
+          <a:noFill/>
+        </p:spPr>
+        <p:txBody>
+          <a:bodyPr wrap="square" rtlCol="0">
+            <a:spAutoFit/>
+          </a:bodyPr>
+          <a:lstStyle/>
+          <a:p>
+            <a:r>
+              <a:rPr lang="en-US" sz="2800" dirty="0"/>
+              <a:t>Compensation Methods</a:t>
+            </a:r>
+          </a:p>
+        </p:txBody>
+      </p:sp>
+      <p:graphicFrame>
+        <p:nvGraphicFramePr>
+          <p:cNvPr id="3" name="Table 2">
+            <a:extLst>
+              <a:ext uri="{FF2B5EF4-FFF2-40B4-BE49-F238E27FC236}">
+                <a16:creationId xmlns:a16="http://schemas.microsoft.com/office/drawing/2014/main" id="{59F996DC-3834-4155-A6C8-09DB22638982}"/>
+              </a:ext>
+            </a:extLst>
+          </p:cNvPr>
+          <p:cNvGraphicFramePr>
+            <a:graphicFrameLocks noGrp="1"/>
+          </p:cNvGraphicFramePr>
+          <p:nvPr>
+            <p:extLst/>
+          </p:nvPr>
+        </p:nvGraphicFramePr>
+        <p:xfrm>
+          <a:off x="715639" y="1591420"/>
+          <a:ext cx="10597804" cy="5129944"/>
+        </p:xfrm>
+        <a:graphic>
+          <a:graphicData uri="http://schemas.openxmlformats.org/drawingml/2006/table">
+            <a:tbl>
+              <a:tblPr/>
+              <a:tblGrid>
+                <a:gridCol w="5298902">
+                  <a:extLst>
+                    <a:ext uri="{9D8B030D-6E8A-4147-A177-3AD203B41FA5}">
+                      <a16:colId xmlns:a16="http://schemas.microsoft.com/office/drawing/2014/main" val="1361642825"/>
+                    </a:ext>
+                  </a:extLst>
+                </a:gridCol>
+                <a:gridCol w="5298902">
+                  <a:extLst>
+                    <a:ext uri="{9D8B030D-6E8A-4147-A177-3AD203B41FA5}">
+                      <a16:colId xmlns:a16="http://schemas.microsoft.com/office/drawing/2014/main" val="3988962726"/>
+                    </a:ext>
+                  </a:extLst>
+                </a:gridCol>
+              </a:tblGrid>
+              <a:tr h="2564972">
+                <a:tc>
+                  <a:txBody>
+                    <a:bodyPr/>
+                    <a:lstStyle/>
+                    <a:p>
+                      <a:endParaRPr lang="en-US" dirty="0"/>
+                    </a:p>
+                  </a:txBody>
+                  <a:tcPr>
+                    <a:lnL w="12700" cmpd="sng">
+                      <a:solidFill>
+                        <a:schemeClr val="tx1"/>
+                      </a:solidFill>
+                      <a:prstDash val="solid"/>
+                    </a:lnL>
+                    <a:lnR w="12700" cap="flat" cmpd="sng" algn="ctr">
+                      <a:solidFill>
+                        <a:schemeClr val="tx1"/>
+                      </a:solidFill>
+                      <a:prstDash val="solid"/>
+                      <a:round/>
+                      <a:headEnd type="none" w="med" len="med"/>
+                      <a:tailEnd type="none" w="med" len="med"/>
+                    </a:lnR>
+                    <a:lnT w="12700" cmpd="sng">
+                      <a:solidFill>
+                        <a:schemeClr val="tx1"/>
+                      </a:solidFill>
+                      <a:prstDash val="solid"/>
+                    </a:lnT>
+                    <a:lnB w="12700" cmpd="sng">
+                      <a:solidFill>
+                        <a:schemeClr val="tx1"/>
+                      </a:solidFill>
+                      <a:prstDash val="solid"/>
+                    </a:lnB>
+                  </a:tcPr>
+                </a:tc>
+                <a:tc>
+                  <a:txBody>
+                    <a:bodyPr/>
+                    <a:lstStyle/>
+                    <a:p>
+                      <a:endParaRPr lang="en-US" dirty="0"/>
+                    </a:p>
+                  </a:txBody>
+                  <a:tcPr>
+                    <a:lnL w="12700" cap="flat" cmpd="sng" algn="ctr">
+                      <a:solidFill>
+                        <a:schemeClr val="tx1"/>
+                      </a:solidFill>
+                      <a:prstDash val="solid"/>
+                      <a:round/>
+                      <a:headEnd type="none" w="med" len="med"/>
+                      <a:tailEnd type="none" w="med" len="med"/>
+                    </a:lnL>
+                    <a:lnR w="12700" cmpd="sng">
+                      <a:solidFill>
+                        <a:schemeClr val="tx1"/>
+                      </a:solidFill>
+                      <a:prstDash val="solid"/>
+                    </a:lnR>
+                    <a:lnT w="12700" cmpd="sng">
+                      <a:solidFill>
+                        <a:schemeClr val="tx1"/>
+                      </a:solidFill>
+                      <a:prstDash val="solid"/>
+                    </a:lnT>
+                    <a:lnB w="12700" cmpd="sng">
+                      <a:solidFill>
+                        <a:schemeClr val="tx1"/>
+                      </a:solidFill>
+                      <a:prstDash val="solid"/>
+                    </a:lnB>
+                  </a:tcPr>
+                </a:tc>
+                <a:extLst>
+                  <a:ext uri="{0D108BD9-81ED-4DB2-BD59-A6C34878D82A}">
+                    <a16:rowId xmlns:a16="http://schemas.microsoft.com/office/drawing/2014/main" val="1887942329"/>
+                  </a:ext>
+                </a:extLst>
+              </a:tr>
+              <a:tr h="2564972">
+                <a:tc>
+                  <a:txBody>
+                    <a:bodyPr/>
+                    <a:lstStyle/>
+                    <a:p>
+                      <a:endParaRPr lang="en-US" dirty="0"/>
+                    </a:p>
+                  </a:txBody>
+                  <a:tcPr>
+                    <a:lnL w="12700" cmpd="sng">
+                      <a:solidFill>
+                        <a:schemeClr val="tx1"/>
+                      </a:solidFill>
+                      <a:prstDash val="solid"/>
+                    </a:lnL>
+                    <a:lnR w="12700" cmpd="sng">
+                      <a:solidFill>
+                        <a:schemeClr val="tx1"/>
+                      </a:solidFill>
+                      <a:prstDash val="solid"/>
+                    </a:lnR>
+                    <a:lnT w="12700" cap="flat" cmpd="sng" algn="ctr">
+                      <a:solidFill>
+                        <a:schemeClr val="tx1"/>
+                      </a:solidFill>
+                      <a:prstDash val="solid"/>
+                      <a:round/>
+                      <a:headEnd type="none" w="med" len="med"/>
+                      <a:tailEnd type="none" w="med" len="med"/>
+                    </a:lnT>
+                    <a:lnB w="12700" cmpd="sng">
+                      <a:solidFill>
+                        <a:schemeClr val="tx1"/>
+                      </a:solidFill>
+                      <a:prstDash val="solid"/>
+                    </a:lnB>
+                  </a:tcPr>
+                </a:tc>
+                <a:tc>
+                  <a:txBody>
+                    <a:bodyPr/>
+                    <a:lstStyle/>
+                    <a:p>
+                      <a:endParaRPr lang="en-US" dirty="0"/>
+                    </a:p>
+                  </a:txBody>
+                  <a:tcPr>
+                    <a:lnL w="12700" cap="flat" cmpd="sng" algn="ctr">
+                      <a:solidFill>
+                        <a:schemeClr val="tx1"/>
+                      </a:solidFill>
+                      <a:prstDash val="solid"/>
+                      <a:round/>
+                      <a:headEnd type="none" w="med" len="med"/>
+                      <a:tailEnd type="none" w="med" len="med"/>
+                    </a:lnL>
+                    <a:lnR w="12700" cmpd="sng">
+                      <a:solidFill>
+                        <a:schemeClr val="tx1"/>
+                      </a:solidFill>
+                      <a:prstDash val="solid"/>
+                    </a:lnR>
+                    <a:lnT w="12700" cap="flat" cmpd="sng" algn="ctr">
+                      <a:solidFill>
+                        <a:schemeClr val="tx1"/>
+                      </a:solidFill>
+                      <a:prstDash val="solid"/>
+                      <a:round/>
+                      <a:headEnd type="none" w="med" len="med"/>
+                      <a:tailEnd type="none" w="med" len="med"/>
+                    </a:lnT>
+                    <a:lnB w="12700" cmpd="sng">
+                      <a:solidFill>
+                        <a:schemeClr val="tx1"/>
+                      </a:solidFill>
+                      <a:prstDash val="solid"/>
+                    </a:lnB>
+                  </a:tcPr>
+                </a:tc>
+                <a:extLst>
+                  <a:ext uri="{0D108BD9-81ED-4DB2-BD59-A6C34878D82A}">
+                    <a16:rowId xmlns:a16="http://schemas.microsoft.com/office/drawing/2014/main" val="3119362236"/>
+                  </a:ext>
+                </a:extLst>
+              </a:tr>
+            </a:tbl>
+          </a:graphicData>
+        </a:graphic>
+      </p:graphicFrame>
+      <p:sp>
+        <p:nvSpPr>
+          <p:cNvPr id="4" name="TextBox 3">
+            <a:extLst>
+              <a:ext uri="{FF2B5EF4-FFF2-40B4-BE49-F238E27FC236}">
+                <a16:creationId xmlns:a16="http://schemas.microsoft.com/office/drawing/2014/main" id="{7C2BD6DF-6707-42D9-B5D9-0F2088BFAB55}"/>
+              </a:ext>
+            </a:extLst>
+          </p:cNvPr>
+          <p:cNvSpPr txBox="1"/>
+          <p:nvPr/>
+        </p:nvSpPr>
+        <p:spPr>
+          <a:xfrm>
+            <a:off x="988454" y="984853"/>
+            <a:ext cx="4190261" cy="523220"/>
+          </a:xfrm>
+          <a:prstGeom prst="rect">
+            <a:avLst/>
+          </a:prstGeom>
+          <a:noFill/>
+        </p:spPr>
+        <p:txBody>
+          <a:bodyPr wrap="square" rtlCol="0">
+            <a:spAutoFit/>
+          </a:bodyPr>
+          <a:lstStyle/>
+          <a:p>
+            <a:endParaRPr lang="en-US" sz="2800" dirty="0"/>
+          </a:p>
+        </p:txBody>
+      </p:sp>
+      <p:pic>
+        <p:nvPicPr>
+          <p:cNvPr id="6" name="Picture 5">
+            <a:extLst>
+              <a:ext uri="{FF2B5EF4-FFF2-40B4-BE49-F238E27FC236}">
+                <a16:creationId xmlns:a16="http://schemas.microsoft.com/office/drawing/2014/main" id="{FB47632A-DFC8-43EB-B9F9-0EFC84570F50}"/>
+              </a:ext>
+            </a:extLst>
+          </p:cNvPr>
+          <p:cNvPicPr>
+            <a:picLocks noChangeAspect="1"/>
+          </p:cNvPicPr>
+          <p:nvPr/>
+        </p:nvPicPr>
+        <p:blipFill>
+          <a:blip r:embed="rId2"/>
+          <a:stretch>
+            <a:fillRect/>
+          </a:stretch>
+        </p:blipFill>
+        <p:spPr>
+          <a:xfrm>
+            <a:off x="1496988" y="4427106"/>
+            <a:ext cx="3820158" cy="2213920"/>
+          </a:xfrm>
+          <a:prstGeom prst="rect">
+            <a:avLst/>
+          </a:prstGeom>
+        </p:spPr>
+      </p:pic>
+      <p:pic>
+        <p:nvPicPr>
+          <p:cNvPr id="7" name="Picture 6">
+            <a:extLst>
+              <a:ext uri="{FF2B5EF4-FFF2-40B4-BE49-F238E27FC236}">
+                <a16:creationId xmlns:a16="http://schemas.microsoft.com/office/drawing/2014/main" id="{D88F2A1F-EC95-4D58-B7EA-7836F626099E}"/>
+              </a:ext>
+            </a:extLst>
+          </p:cNvPr>
+          <p:cNvPicPr>
+            <a:picLocks noChangeAspect="1"/>
+          </p:cNvPicPr>
+          <p:nvPr/>
+        </p:nvPicPr>
+        <p:blipFill>
+          <a:blip r:embed="rId3"/>
+          <a:stretch>
+            <a:fillRect/>
+          </a:stretch>
+        </p:blipFill>
+        <p:spPr>
+          <a:xfrm>
+            <a:off x="6618512" y="2032492"/>
+            <a:ext cx="4193513" cy="2039224"/>
+          </a:xfrm>
+          <a:prstGeom prst="rect">
+            <a:avLst/>
+          </a:prstGeom>
+        </p:spPr>
+      </p:pic>
+      <p:pic>
+        <p:nvPicPr>
+          <p:cNvPr id="8" name="Picture 7">
+            <a:extLst>
+              <a:ext uri="{FF2B5EF4-FFF2-40B4-BE49-F238E27FC236}">
+                <a16:creationId xmlns:a16="http://schemas.microsoft.com/office/drawing/2014/main" id="{9D72FEC2-F50C-484A-AC7C-06AEB003FC54}"/>
+              </a:ext>
+            </a:extLst>
+          </p:cNvPr>
+          <p:cNvPicPr>
+            <a:picLocks noChangeAspect="1"/>
+          </p:cNvPicPr>
+          <p:nvPr/>
+        </p:nvPicPr>
+        <p:blipFill>
+          <a:blip r:embed="rId4"/>
+          <a:stretch>
+            <a:fillRect/>
+          </a:stretch>
+        </p:blipFill>
+        <p:spPr>
+          <a:xfrm>
+            <a:off x="6618512" y="4598378"/>
+            <a:ext cx="4076500" cy="1871375"/>
+          </a:xfrm>
+          <a:prstGeom prst="rect">
+            <a:avLst/>
+          </a:prstGeom>
+        </p:spPr>
+      </p:pic>
+      <p:sp>
+        <p:nvSpPr>
+          <p:cNvPr id="9" name="TextBox 8">
+            <a:extLst>
+              <a:ext uri="{FF2B5EF4-FFF2-40B4-BE49-F238E27FC236}">
+                <a16:creationId xmlns:a16="http://schemas.microsoft.com/office/drawing/2014/main" id="{A434D47F-58B6-456A-93FA-C5E4759D8FE0}"/>
+              </a:ext>
+            </a:extLst>
+          </p:cNvPr>
+          <p:cNvSpPr txBox="1"/>
+          <p:nvPr/>
+        </p:nvSpPr>
+        <p:spPr>
+          <a:xfrm>
+            <a:off x="2325277" y="1642452"/>
+            <a:ext cx="2320894" cy="523220"/>
+          </a:xfrm>
+          <a:prstGeom prst="rect">
+            <a:avLst/>
+          </a:prstGeom>
+          <a:noFill/>
+        </p:spPr>
+        <p:txBody>
+          <a:bodyPr wrap="square" rtlCol="0">
+            <a:spAutoFit/>
+          </a:bodyPr>
+          <a:lstStyle/>
+          <a:p>
+            <a:r>
+              <a:rPr lang="en-US" sz="2800" dirty="0"/>
+              <a:t>Series-Series</a:t>
+            </a:r>
+          </a:p>
+        </p:txBody>
+      </p:sp>
+      <p:pic>
+        <p:nvPicPr>
+          <p:cNvPr id="5" name="Picture 4">
+            <a:extLst>
+              <a:ext uri="{FF2B5EF4-FFF2-40B4-BE49-F238E27FC236}">
+                <a16:creationId xmlns:a16="http://schemas.microsoft.com/office/drawing/2014/main" id="{B0B56757-118C-4152-BA7A-F4477574401F}"/>
+              </a:ext>
+            </a:extLst>
+          </p:cNvPr>
+          <p:cNvPicPr>
+            <a:picLocks noChangeAspect="1"/>
+          </p:cNvPicPr>
+          <p:nvPr/>
+        </p:nvPicPr>
+        <p:blipFill rotWithShape="1">
+          <a:blip r:embed="rId5"/>
+          <a:srcRect b="17011"/>
+          <a:stretch/>
+        </p:blipFill>
+        <p:spPr>
+          <a:xfrm>
+            <a:off x="1594072" y="2106752"/>
+            <a:ext cx="3625990" cy="1890704"/>
+          </a:xfrm>
+          <a:prstGeom prst="rect">
+            <a:avLst/>
+          </a:prstGeom>
+        </p:spPr>
+      </p:pic>
+      <p:sp>
+        <p:nvSpPr>
+          <p:cNvPr id="10" name="TextBox 9">
+            <a:extLst>
+              <a:ext uri="{FF2B5EF4-FFF2-40B4-BE49-F238E27FC236}">
+                <a16:creationId xmlns:a16="http://schemas.microsoft.com/office/drawing/2014/main" id="{B600D04D-8051-4FF3-B266-F85DE15A412F}"/>
+              </a:ext>
+            </a:extLst>
+          </p:cNvPr>
+          <p:cNvSpPr txBox="1"/>
+          <p:nvPr/>
+        </p:nvSpPr>
+        <p:spPr>
+          <a:xfrm>
+            <a:off x="7709565" y="1555214"/>
+            <a:ext cx="2320894" cy="523220"/>
+          </a:xfrm>
+          <a:prstGeom prst="rect">
+            <a:avLst/>
+          </a:prstGeom>
+          <a:noFill/>
+        </p:spPr>
+        <p:txBody>
+          <a:bodyPr wrap="square" rtlCol="0">
+            <a:spAutoFit/>
+          </a:bodyPr>
+          <a:lstStyle/>
+          <a:p>
+            <a:r>
+              <a:rPr lang="en-US" sz="2800" dirty="0"/>
+              <a:t>Parallel-Series</a:t>
+            </a:r>
+          </a:p>
+        </p:txBody>
+      </p:sp>
+      <p:sp>
+        <p:nvSpPr>
+          <p:cNvPr id="11" name="TextBox 10">
+            <a:extLst>
+              <a:ext uri="{FF2B5EF4-FFF2-40B4-BE49-F238E27FC236}">
+                <a16:creationId xmlns:a16="http://schemas.microsoft.com/office/drawing/2014/main" id="{007FCEA5-C15B-43A1-83F0-CEB73AB868B8}"/>
+              </a:ext>
+            </a:extLst>
+          </p:cNvPr>
+          <p:cNvSpPr txBox="1"/>
+          <p:nvPr/>
+        </p:nvSpPr>
+        <p:spPr>
+          <a:xfrm>
+            <a:off x="7709564" y="4295095"/>
+            <a:ext cx="2985447" cy="523220"/>
+          </a:xfrm>
+          <a:prstGeom prst="rect">
+            <a:avLst/>
+          </a:prstGeom>
+          <a:noFill/>
+        </p:spPr>
+        <p:txBody>
+          <a:bodyPr wrap="square" rtlCol="0">
+            <a:spAutoFit/>
+          </a:bodyPr>
+          <a:lstStyle/>
+          <a:p>
+            <a:r>
+              <a:rPr lang="en-US" sz="2800" dirty="0"/>
+              <a:t>Parallel-Parallel</a:t>
+            </a:r>
+          </a:p>
+        </p:txBody>
+      </p:sp>
+      <p:sp>
+        <p:nvSpPr>
+          <p:cNvPr id="12" name="TextBox 11">
+            <a:extLst>
+              <a:ext uri="{FF2B5EF4-FFF2-40B4-BE49-F238E27FC236}">
+                <a16:creationId xmlns:a16="http://schemas.microsoft.com/office/drawing/2014/main" id="{EBF05A50-C5FB-4A63-B6A1-188ED7E79F71}"/>
+              </a:ext>
+            </a:extLst>
+          </p:cNvPr>
+          <p:cNvSpPr txBox="1"/>
+          <p:nvPr/>
+        </p:nvSpPr>
+        <p:spPr>
+          <a:xfrm>
+            <a:off x="2325277" y="4284366"/>
+            <a:ext cx="2985447" cy="523220"/>
+          </a:xfrm>
+          <a:prstGeom prst="rect">
+            <a:avLst/>
+          </a:prstGeom>
+          <a:noFill/>
+        </p:spPr>
+        <p:txBody>
+          <a:bodyPr wrap="square" rtlCol="0">
+            <a:spAutoFit/>
+          </a:bodyPr>
+          <a:lstStyle/>
+          <a:p>
+            <a:r>
+              <a:rPr lang="en-US" sz="2800" dirty="0"/>
+              <a:t>Series-Parallel</a:t>
+            </a:r>
+          </a:p>
+        </p:txBody>
+      </p:sp>
+    </p:spTree>
+    <p:extLst>
+      <p:ext uri="{BB962C8B-B14F-4D97-AF65-F5344CB8AC3E}">
+        <p14:creationId xmlns:p14="http://schemas.microsoft.com/office/powerpoint/2010/main" val="621593823"/>
+      </p:ext>
+    </p:extLst>
+  </p:cSld>
+  <p:clrMapOvr>
+    <a:masterClrMapping/>
+  </p:clrMapOvr>
+</p:sld>
+</file>
+
+<file path=ppt/slides/slide5.xml><?xml version="1.0" encoding="utf-8"?>
 <p:sld xmlns:a="http://schemas.openxmlformats.org/drawingml/2006/main" xmlns:r="http://schemas.openxmlformats.org/officeDocument/2006/relationships" xmlns:p="http://schemas.openxmlformats.org/presentationml/2006/main">
   <p:cSld>
     <p:spTree>
@@ -28173,7 +29235,7 @@
 </p:sld>
 </file>
 
-<file path=ppt/slides/slide5.xml><?xml version="1.0" encoding="utf-8"?>
+<file path=ppt/slides/slide6.xml><?xml version="1.0" encoding="utf-8"?>
 <p:sld xmlns:a="http://schemas.openxmlformats.org/drawingml/2006/main" xmlns:r="http://schemas.openxmlformats.org/officeDocument/2006/relationships" xmlns:p="http://schemas.openxmlformats.org/presentationml/2006/main">
   <p:cSld>
     <p:spTree>
@@ -28275,7 +29337,7 @@
 </p:sld>
 </file>
 
-<file path=ppt/slides/slide6.xml><?xml version="1.0" encoding="utf-8"?>
+<file path=ppt/slides/slide7.xml><?xml version="1.0" encoding="utf-8"?>
 <p:sld xmlns:a="http://schemas.openxmlformats.org/drawingml/2006/main" xmlns:r="http://schemas.openxmlformats.org/officeDocument/2006/relationships" xmlns:p="http://schemas.openxmlformats.org/presentationml/2006/main">
   <p:cSld>
     <p:spTree>
@@ -28567,7 +29629,7 @@
 </p:sld>
 </file>
 
-<file path=ppt/slides/slide7.xml><?xml version="1.0" encoding="utf-8"?>
+<file path=ppt/slides/slide8.xml><?xml version="1.0" encoding="utf-8"?>
 <p:sld xmlns:a="http://schemas.openxmlformats.org/drawingml/2006/main" xmlns:r="http://schemas.openxmlformats.org/officeDocument/2006/relationships" xmlns:p="http://schemas.openxmlformats.org/presentationml/2006/main">
   <p:cSld>
     <p:spTree>
@@ -28818,7 +29880,7 @@
 </p:sld>
 </file>
 
-<file path=ppt/slides/slide8.xml><?xml version="1.0" encoding="utf-8"?>
+<file path=ppt/slides/slide9.xml><?xml version="1.0" encoding="utf-8"?>
 <p:sld xmlns:a="http://schemas.openxmlformats.org/drawingml/2006/main" xmlns:r="http://schemas.openxmlformats.org/officeDocument/2006/relationships" xmlns:p="http://schemas.openxmlformats.org/presentationml/2006/main">
   <p:cSld>
     <p:spTree>
@@ -28937,498 +29999,6 @@
     <p:extLst>
       <p:ext uri="{BB962C8B-B14F-4D97-AF65-F5344CB8AC3E}">
         <p14:creationId xmlns:p14="http://schemas.microsoft.com/office/powerpoint/2010/main" val="1257412631"/>
-      </p:ext>
-    </p:extLst>
-  </p:cSld>
-  <p:clrMapOvr>
-    <a:masterClrMapping/>
-  </p:clrMapOvr>
-</p:sld>
-</file>
-
-<file path=ppt/slides/slide9.xml><?xml version="1.0" encoding="utf-8"?>
-<p:sld xmlns:a="http://schemas.openxmlformats.org/drawingml/2006/main" xmlns:r="http://schemas.openxmlformats.org/officeDocument/2006/relationships" xmlns:p="http://schemas.openxmlformats.org/presentationml/2006/main">
-  <p:cSld>
-    <p:spTree>
-      <p:nvGrpSpPr>
-        <p:cNvPr id="1" name=""/>
-        <p:cNvGrpSpPr/>
-        <p:nvPr/>
-      </p:nvGrpSpPr>
-      <p:grpSpPr>
-        <a:xfrm>
-          <a:off x="0" y="0"/>
-          <a:ext cx="0" cy="0"/>
-          <a:chOff x="0" y="0"/>
-          <a:chExt cx="0" cy="0"/>
-        </a:xfrm>
-      </p:grpSpPr>
-      <p:sp>
-        <p:nvSpPr>
-          <p:cNvPr id="3" name="TextBox 2">
-            <a:extLst>
-              <a:ext uri="{FF2B5EF4-FFF2-40B4-BE49-F238E27FC236}">
-                <a16:creationId xmlns:a16="http://schemas.microsoft.com/office/drawing/2014/main" id="{64B0A007-14B1-4ED6-B4ED-575B93B3FE4C}"/>
-              </a:ext>
-            </a:extLst>
-          </p:cNvPr>
-          <p:cNvSpPr txBox="1"/>
-          <p:nvPr/>
-        </p:nvSpPr>
-        <p:spPr>
-          <a:xfrm>
-            <a:off x="3194612" y="289367"/>
-            <a:ext cx="6713317" cy="861774"/>
-          </a:xfrm>
-          <a:prstGeom prst="rect">
-            <a:avLst/>
-          </a:prstGeom>
-          <a:noFill/>
-        </p:spPr>
-        <p:txBody>
-          <a:bodyPr wrap="square" rtlCol="0">
-            <a:spAutoFit/>
-          </a:bodyPr>
-          <a:lstStyle/>
-          <a:p>
-            <a:r>
-              <a:rPr lang="en-US" sz="3200" b="1" dirty="0"/>
-              <a:t>Series Compensation- Series DC BUS</a:t>
-            </a:r>
-          </a:p>
-          <a:p>
-            <a:endParaRPr lang="en-US" dirty="0"/>
-          </a:p>
-        </p:txBody>
-      </p:sp>
-      <mc:AlternateContent xmlns:mc="http://schemas.openxmlformats.org/markup-compatibility/2006" xmlns:a14="http://schemas.microsoft.com/office/drawing/2010/main">
-        <mc:Choice Requires="a14">
-          <p:sp>
-            <p:nvSpPr>
-              <p:cNvPr id="5" name="TextBox 4">
-                <a:extLst>
-                  <a:ext uri="{FF2B5EF4-FFF2-40B4-BE49-F238E27FC236}">
-                    <a16:creationId xmlns:a16="http://schemas.microsoft.com/office/drawing/2014/main" id="{2C9A23E7-D786-40F7-9EDF-68E264C6281A}"/>
-                  </a:ext>
-                </a:extLst>
-              </p:cNvPr>
-              <p:cNvSpPr txBox="1"/>
-              <p:nvPr/>
-            </p:nvSpPr>
-            <p:spPr>
-              <a:xfrm>
-                <a:off x="4862096" y="2685327"/>
-                <a:ext cx="5312779" cy="553998"/>
-              </a:xfrm>
-              <a:prstGeom prst="rect">
-                <a:avLst/>
-              </a:prstGeom>
-              <a:noFill/>
-            </p:spPr>
-            <p:txBody>
-              <a:bodyPr wrap="square" rtlCol="0">
-                <a:spAutoFit/>
-              </a:bodyPr>
-              <a:lstStyle/>
-              <a:p>
-                <a:pPr/>
-                <a14:m>
-                  <m:oMathPara xmlns:m="http://schemas.openxmlformats.org/officeDocument/2006/math">
-                    <m:oMathParaPr>
-                      <m:jc m:val="centerGroup"/>
-                    </m:oMathParaPr>
-                    <m:oMath xmlns:m="http://schemas.openxmlformats.org/officeDocument/2006/math">
-                      <m:sSub>
-                        <m:sSubPr>
-                          <m:ctrlPr>
-                            <a:rPr lang="en-US" sz="3000" b="0" i="1" smtClean="0">
-                              <a:latin typeface="Cambria Math" panose="02040503050406030204" pitchFamily="18" charset="0"/>
-                            </a:rPr>
-                          </m:ctrlPr>
-                        </m:sSubPr>
-                        <m:e>
-                          <m:r>
-                            <a:rPr lang="en-US" sz="3000" b="0" i="0" smtClean="0">
-                              <a:latin typeface="Cambria Math" panose="02040503050406030204" pitchFamily="18" charset="0"/>
-                            </a:rPr>
-                            <m:t>|</m:t>
-                          </m:r>
-                          <m:r>
-                            <m:rPr>
-                              <m:sty m:val="p"/>
-                            </m:rPr>
-                            <a:rPr lang="en-US" sz="3000" b="0" i="0" smtClean="0">
-                              <a:latin typeface="Cambria Math" panose="02040503050406030204" pitchFamily="18" charset="0"/>
-                            </a:rPr>
-                            <m:t>I</m:t>
-                          </m:r>
-                        </m:e>
-                        <m:sub>
-                          <m:r>
-                            <m:rPr>
-                              <m:sty m:val="p"/>
-                            </m:rPr>
-                            <a:rPr lang="en-US" sz="3000" b="0" i="0" smtClean="0">
-                              <a:latin typeface="Cambria Math" panose="02040503050406030204" pitchFamily="18" charset="0"/>
-                            </a:rPr>
-                            <m:t>S</m:t>
-                          </m:r>
-                          <m:r>
-                            <a:rPr lang="en-US" sz="3000" b="0" i="0" smtClean="0">
-                              <a:latin typeface="Cambria Math" panose="02040503050406030204" pitchFamily="18" charset="0"/>
-                            </a:rPr>
-                            <m:t>1</m:t>
-                          </m:r>
-                        </m:sub>
-                      </m:sSub>
-                      <m:r>
-                        <a:rPr lang="en-US" sz="3000" b="0" i="1" smtClean="0">
-                          <a:latin typeface="Cambria Math" panose="02040503050406030204" pitchFamily="18" charset="0"/>
-                        </a:rPr>
-                        <m:t>|</m:t>
-                      </m:r>
-                      <m:r>
-                        <a:rPr lang="en-US" sz="3000" b="0" i="0" smtClean="0">
-                          <a:latin typeface="Cambria Math" panose="02040503050406030204" pitchFamily="18" charset="0"/>
-                        </a:rPr>
-                        <m:t>=</m:t>
-                      </m:r>
-                      <m:sSub>
-                        <m:sSubPr>
-                          <m:ctrlPr>
-                            <a:rPr lang="en-US" sz="3000" b="0" i="1" smtClean="0">
-                              <a:latin typeface="Cambria Math" panose="02040503050406030204" pitchFamily="18" charset="0"/>
-                            </a:rPr>
-                          </m:ctrlPr>
-                        </m:sSubPr>
-                        <m:e>
-                          <m:r>
-                            <a:rPr lang="en-US" sz="3000" b="0" i="0" smtClean="0">
-                              <a:latin typeface="Cambria Math" panose="02040503050406030204" pitchFamily="18" charset="0"/>
-                            </a:rPr>
-                            <m:t>|</m:t>
-                          </m:r>
-                          <m:r>
-                            <m:rPr>
-                              <m:sty m:val="p"/>
-                            </m:rPr>
-                            <a:rPr lang="en-US" sz="3000" b="0" i="0" smtClean="0">
-                              <a:latin typeface="Cambria Math" panose="02040503050406030204" pitchFamily="18" charset="0"/>
-                            </a:rPr>
-                            <m:t>I</m:t>
-                          </m:r>
-                        </m:e>
-                        <m:sub>
-                          <m:r>
-                            <m:rPr>
-                              <m:sty m:val="p"/>
-                            </m:rPr>
-                            <a:rPr lang="en-US" sz="3000" b="0" i="0" smtClean="0">
-                              <a:latin typeface="Cambria Math" panose="02040503050406030204" pitchFamily="18" charset="0"/>
-                            </a:rPr>
-                            <m:t>S</m:t>
-                          </m:r>
-                          <m:r>
-                            <a:rPr lang="en-US" sz="3000" b="0" i="0" smtClean="0">
-                              <a:latin typeface="Cambria Math" panose="02040503050406030204" pitchFamily="18" charset="0"/>
-                            </a:rPr>
-                            <m:t>2</m:t>
-                          </m:r>
-                        </m:sub>
-                      </m:sSub>
-                      <m:r>
-                        <a:rPr lang="en-US" sz="3000" b="0" i="1" smtClean="0">
-                          <a:latin typeface="Cambria Math" panose="02040503050406030204" pitchFamily="18" charset="0"/>
-                        </a:rPr>
-                        <m:t>|</m:t>
-                      </m:r>
-                      <m:r>
-                        <a:rPr lang="en-US" sz="3000" b="0" i="0" smtClean="0">
-                          <a:latin typeface="Cambria Math" panose="02040503050406030204" pitchFamily="18" charset="0"/>
-                        </a:rPr>
-                        <m:t>   ….(1)</m:t>
-                      </m:r>
-                    </m:oMath>
-                  </m:oMathPara>
-                </a14:m>
-                <a:endParaRPr lang="en-US" sz="3000" dirty="0"/>
-              </a:p>
-            </p:txBody>
-          </p:sp>
-        </mc:Choice>
-        <mc:Fallback xmlns="">
-          <p:sp>
-            <p:nvSpPr>
-              <p:cNvPr id="5" name="TextBox 4">
-                <a:extLst>
-                  <a:ext uri="{FF2B5EF4-FFF2-40B4-BE49-F238E27FC236}">
-                    <a16:creationId xmlns:a16="http://schemas.microsoft.com/office/drawing/2014/main" id="{2C9A23E7-D786-40F7-9EDF-68E264C6281A}"/>
-                  </a:ext>
-                </a:extLst>
-              </p:cNvPr>
-              <p:cNvSpPr txBox="1">
-                <a:spLocks noRot="1" noChangeAspect="1" noMove="1" noResize="1" noEditPoints="1" noAdjustHandles="1" noChangeArrowheads="1" noChangeShapeType="1" noTextEdit="1"/>
-              </p:cNvSpPr>
-              <p:nvPr/>
-            </p:nvSpPr>
-            <p:spPr>
-              <a:xfrm>
-                <a:off x="4862096" y="2685327"/>
-                <a:ext cx="5312779" cy="553998"/>
-              </a:xfrm>
-              <a:prstGeom prst="rect">
-                <a:avLst/>
-              </a:prstGeom>
-              <a:blipFill>
-                <a:blip r:embed="rId2"/>
-                <a:stretch>
-                  <a:fillRect/>
-                </a:stretch>
-              </a:blipFill>
-            </p:spPr>
-            <p:txBody>
-              <a:bodyPr/>
-              <a:lstStyle/>
-              <a:p>
-                <a:r>
-                  <a:rPr lang="en-US">
-                    <a:noFill/>
-                  </a:rPr>
-                  <a:t> </a:t>
-                </a:r>
-              </a:p>
-            </p:txBody>
-          </p:sp>
-        </mc:Fallback>
-      </mc:AlternateContent>
-      <p:pic>
-        <p:nvPicPr>
-          <p:cNvPr id="6" name="Picture 5">
-            <a:extLst>
-              <a:ext uri="{FF2B5EF4-FFF2-40B4-BE49-F238E27FC236}">
-                <a16:creationId xmlns:a16="http://schemas.microsoft.com/office/drawing/2014/main" id="{E59EBF45-E9B2-4ACF-83E4-8EA4E47E8CA4}"/>
-              </a:ext>
-            </a:extLst>
-          </p:cNvPr>
-          <p:cNvPicPr>
-            <a:picLocks noChangeAspect="1"/>
-          </p:cNvPicPr>
-          <p:nvPr/>
-        </p:nvPicPr>
-        <p:blipFill>
-          <a:blip r:embed="rId3"/>
-          <a:stretch>
-            <a:fillRect/>
-          </a:stretch>
-        </p:blipFill>
-        <p:spPr>
-          <a:xfrm>
-            <a:off x="1007428" y="1151141"/>
-            <a:ext cx="3379377" cy="5026180"/>
-          </a:xfrm>
-          <a:prstGeom prst="rect">
-            <a:avLst/>
-          </a:prstGeom>
-        </p:spPr>
-      </p:pic>
-      <mc:AlternateContent xmlns:mc="http://schemas.openxmlformats.org/markup-compatibility/2006" xmlns:a14="http://schemas.microsoft.com/office/drawing/2010/main">
-        <mc:Choice Requires="a14">
-          <p:sp>
-            <p:nvSpPr>
-              <p:cNvPr id="8" name="Rectangle 7">
-                <a:extLst>
-                  <a:ext uri="{FF2B5EF4-FFF2-40B4-BE49-F238E27FC236}">
-                    <a16:creationId xmlns:a16="http://schemas.microsoft.com/office/drawing/2014/main" id="{FAE97160-661F-4B1A-A686-6D5ED8C6F61E}"/>
-                  </a:ext>
-                </a:extLst>
-              </p:cNvPr>
-              <p:cNvSpPr/>
-              <p:nvPr/>
-            </p:nvSpPr>
-            <p:spPr>
-              <a:xfrm>
-                <a:off x="5748760" y="3778881"/>
-                <a:ext cx="3869008" cy="553998"/>
-              </a:xfrm>
-              <a:prstGeom prst="rect">
-                <a:avLst/>
-              </a:prstGeom>
-            </p:spPr>
-            <p:txBody>
-              <a:bodyPr wrap="none">
-                <a:spAutoFit/>
-              </a:bodyPr>
-              <a:lstStyle/>
-              <a:p>
-                <a:pPr/>
-                <a14:m>
-                  <m:oMathPara xmlns:m="http://schemas.openxmlformats.org/officeDocument/2006/math">
-                    <m:oMathParaPr>
-                      <m:jc m:val="centerGroup"/>
-                    </m:oMathParaPr>
-                    <m:oMath xmlns:m="http://schemas.openxmlformats.org/officeDocument/2006/math">
-                      <m:sSub>
-                        <m:sSubPr>
-                          <m:ctrlPr>
-                            <a:rPr lang="en-US" sz="3000" b="0" i="1" smtClean="0">
-                              <a:latin typeface="Cambria Math" panose="02040503050406030204" pitchFamily="18" charset="0"/>
-                            </a:rPr>
-                          </m:ctrlPr>
-                        </m:sSubPr>
-                        <m:e>
-                          <m:r>
-                            <m:rPr>
-                              <m:sty m:val="p"/>
-                            </m:rPr>
-                            <a:rPr lang="en-US" sz="3000" b="0" i="0" smtClean="0">
-                              <a:latin typeface="Cambria Math" panose="02040503050406030204" pitchFamily="18" charset="0"/>
-                            </a:rPr>
-                            <m:t>R</m:t>
-                          </m:r>
-                        </m:e>
-                        <m:sub>
-                          <m:r>
-                            <a:rPr lang="en-US" sz="3000" b="0" i="0" smtClean="0">
-                              <a:latin typeface="Cambria Math" panose="02040503050406030204" pitchFamily="18" charset="0"/>
-                            </a:rPr>
-                            <m:t>1</m:t>
-                          </m:r>
-                        </m:sub>
-                      </m:sSub>
-                      <m:r>
-                        <a:rPr lang="en-US" sz="3000" b="0" i="0" smtClean="0">
-                          <a:latin typeface="Cambria Math" panose="02040503050406030204" pitchFamily="18" charset="0"/>
-                        </a:rPr>
-                        <m:t>+</m:t>
-                      </m:r>
-                      <m:sSub>
-                        <m:sSubPr>
-                          <m:ctrlPr>
-                            <a:rPr lang="en-US" sz="3000" b="0" i="1" smtClean="0">
-                              <a:latin typeface="Cambria Math" panose="02040503050406030204" pitchFamily="18" charset="0"/>
-                            </a:rPr>
-                          </m:ctrlPr>
-                        </m:sSubPr>
-                        <m:e>
-                          <m:r>
-                            <m:rPr>
-                              <m:sty m:val="p"/>
-                            </m:rPr>
-                            <a:rPr lang="en-US" sz="3000" b="0" i="0" smtClean="0">
-                              <a:latin typeface="Cambria Math" panose="02040503050406030204" pitchFamily="18" charset="0"/>
-                            </a:rPr>
-                            <m:t>R</m:t>
-                          </m:r>
-                        </m:e>
-                        <m:sub>
-                          <m:r>
-                            <a:rPr lang="en-US" sz="3000" b="0" i="0" smtClean="0">
-                              <a:latin typeface="Cambria Math" panose="02040503050406030204" pitchFamily="18" charset="0"/>
-                            </a:rPr>
-                            <m:t>2</m:t>
-                          </m:r>
-                        </m:sub>
-                      </m:sSub>
-                      <m:r>
-                        <a:rPr lang="en-US" sz="3000" b="0" i="0" smtClean="0">
-                          <a:latin typeface="Cambria Math" panose="02040503050406030204" pitchFamily="18" charset="0"/>
-                        </a:rPr>
-                        <m:t>=</m:t>
-                      </m:r>
-                      <m:sSub>
-                        <m:sSubPr>
-                          <m:ctrlPr>
-                            <a:rPr lang="en-US" sz="3000" b="0" i="1" smtClean="0">
-                              <a:latin typeface="Cambria Math" panose="02040503050406030204" pitchFamily="18" charset="0"/>
-                            </a:rPr>
-                          </m:ctrlPr>
-                        </m:sSubPr>
-                        <m:e>
-                          <m:r>
-                            <m:rPr>
-                              <m:sty m:val="p"/>
-                            </m:rPr>
-                            <a:rPr lang="en-US" sz="3000" b="0" i="0" smtClean="0">
-                              <a:latin typeface="Cambria Math" panose="02040503050406030204" pitchFamily="18" charset="0"/>
-                            </a:rPr>
-                            <m:t>R</m:t>
-                          </m:r>
-                        </m:e>
-                        <m:sub>
-                          <m:r>
-                            <m:rPr>
-                              <m:sty m:val="p"/>
-                            </m:rPr>
-                            <a:rPr lang="en-US" sz="3000" b="0" i="0" smtClean="0">
-                              <a:latin typeface="Cambria Math" panose="02040503050406030204" pitchFamily="18" charset="0"/>
-                            </a:rPr>
-                            <m:t>L</m:t>
-                          </m:r>
-                        </m:sub>
-                      </m:sSub>
-                      <m:r>
-                        <a:rPr lang="en-US" sz="3000" b="0" i="0" smtClean="0">
-                          <a:latin typeface="Cambria Math" panose="02040503050406030204" pitchFamily="18" charset="0"/>
-                        </a:rPr>
-                        <m:t>   …. (2)</m:t>
-                      </m:r>
-                    </m:oMath>
-                  </m:oMathPara>
-                </a14:m>
-                <a:endParaRPr lang="en-US" sz="3000" dirty="0"/>
-              </a:p>
-            </p:txBody>
-          </p:sp>
-        </mc:Choice>
-        <mc:Fallback xmlns="">
-          <p:sp>
-            <p:nvSpPr>
-              <p:cNvPr id="8" name="Rectangle 7">
-                <a:extLst>
-                  <a:ext uri="{FF2B5EF4-FFF2-40B4-BE49-F238E27FC236}">
-                    <a16:creationId xmlns:a16="http://schemas.microsoft.com/office/drawing/2014/main" id="{FAE97160-661F-4B1A-A686-6D5ED8C6F61E}"/>
-                  </a:ext>
-                </a:extLst>
-              </p:cNvPr>
-              <p:cNvSpPr>
-                <a:spLocks noRot="1" noChangeAspect="1" noMove="1" noResize="1" noEditPoints="1" noAdjustHandles="1" noChangeArrowheads="1" noChangeShapeType="1" noTextEdit="1"/>
-              </p:cNvSpPr>
-              <p:nvPr/>
-            </p:nvSpPr>
-            <p:spPr>
-              <a:xfrm>
-                <a:off x="5748760" y="3778881"/>
-                <a:ext cx="3869008" cy="553998"/>
-              </a:xfrm>
-              <a:prstGeom prst="rect">
-                <a:avLst/>
-              </a:prstGeom>
-              <a:blipFill>
-                <a:blip r:embed="rId4"/>
-                <a:stretch>
-                  <a:fillRect/>
-                </a:stretch>
-              </a:blipFill>
-            </p:spPr>
-            <p:txBody>
-              <a:bodyPr/>
-              <a:lstStyle/>
-              <a:p>
-                <a:r>
-                  <a:rPr lang="en-US">
-                    <a:noFill/>
-                  </a:rPr>
-                  <a:t> </a:t>
-                </a:r>
-              </a:p>
-            </p:txBody>
-          </p:sp>
-        </mc:Fallback>
-      </mc:AlternateContent>
-    </p:spTree>
-    <p:extLst>
-      <p:ext uri="{BB962C8B-B14F-4D97-AF65-F5344CB8AC3E}">
-        <p14:creationId xmlns:p14="http://schemas.microsoft.com/office/powerpoint/2010/main" val="2249130011"/>
       </p:ext>
     </p:extLst>
   </p:cSld>

</xml_diff>